<commit_message>
minor updates to images and major updates to poster
</commit_message>
<xml_diff>
--- a/Forces used.pptx
+++ b/Forces used.pptx
@@ -105,6 +105,11 @@
       </a:defRPr>
     </a:lvl9pPr>
   </p:defaultTextStyle>
+  <p:extLst>
+    <p:ext uri="{EFAFB233-063F-42B5-8137-9DF3F51BA10A}">
+      <p15:sldGuideLst xmlns:p15="http://schemas.microsoft.com/office/powerpoint/2012/main"/>
+    </p:ext>
+  </p:extLst>
 </p:presentation>
 </file>
 
@@ -3206,14 +3211,7 @@
                 <a:latin typeface="Arial" panose="020B0604020202020204" pitchFamily="34" charset="0"/>
                 <a:cs typeface="Arial" panose="020B0604020202020204" pitchFamily="34" charset="0"/>
               </a:rPr>
-              <a:t>Thrust (</a:t>
-            </a:r>
-            <a:r>
-              <a:rPr lang="en-US" sz="2800" dirty="0" smtClean="0">
-                <a:latin typeface="Arial" panose="020B0604020202020204" pitchFamily="34" charset="0"/>
-                <a:cs typeface="Arial" panose="020B0604020202020204" pitchFamily="34" charset="0"/>
-              </a:rPr>
-              <a:t>F</a:t>
+              <a:t>Thrust (F</a:t>
             </a:r>
             <a:r>
               <a:rPr lang="en-US" sz="2800" baseline="-25000" dirty="0" smtClean="0">
@@ -3229,10 +3227,6 @@
               </a:rPr>
               <a:t>)</a:t>
             </a:r>
-            <a:endParaRPr lang="en-US" sz="2800" dirty="0" smtClean="0">
-              <a:latin typeface="Arial" panose="020B0604020202020204" pitchFamily="34" charset="0"/>
-              <a:cs typeface="Arial" panose="020B0604020202020204" pitchFamily="34" charset="0"/>
-            </a:endParaRPr>
           </a:p>
         </p:txBody>
       </p:sp>
@@ -3506,145 +3500,6 @@
       </p:sp>
       <p:sp>
         <p:nvSpPr>
-          <p:cNvPr id="4" name="TextBox 3"/>
-          <p:cNvSpPr txBox="1"/>
-          <p:nvPr/>
-        </p:nvSpPr>
-        <p:spPr>
-          <a:xfrm>
-            <a:off x="970012" y="4212746"/>
-            <a:ext cx="2700867" cy="584775"/>
-          </a:xfrm>
-          <a:prstGeom prst="rect">
-            <a:avLst/>
-          </a:prstGeom>
-          <a:noFill/>
-        </p:spPr>
-        <p:txBody>
-          <a:bodyPr wrap="square" rtlCol="0">
-            <a:spAutoFit/>
-          </a:bodyPr>
-          <a:lstStyle/>
-          <a:p>
-            <a:r>
-              <a:rPr lang="en-US" sz="3200" dirty="0" smtClean="0"/>
-              <a:t>F</a:t>
-            </a:r>
-            <a:r>
-              <a:rPr lang="en-US" sz="3200" baseline="-25000" dirty="0" smtClean="0"/>
-              <a:t>t</a:t>
-            </a:r>
-            <a:r>
-              <a:rPr lang="en-US" sz="3200" dirty="0" smtClean="0"/>
-              <a:t> = </a:t>
-            </a:r>
-            <a:r>
-              <a:rPr lang="en-US" sz="3200" dirty="0" err="1" smtClean="0"/>
-              <a:t>m</a:t>
-            </a:r>
-            <a:r>
-              <a:rPr lang="en-US" sz="3200" baseline="-25000" dirty="0" err="1" smtClean="0"/>
-              <a:t>b</a:t>
-            </a:r>
-            <a:r>
-              <a:rPr lang="en-US" sz="2000" dirty="0" smtClean="0"/>
-              <a:t> </a:t>
-            </a:r>
-            <a:r>
-              <a:rPr lang="en-US" sz="3200" dirty="0" smtClean="0"/>
-              <a:t>R</a:t>
-            </a:r>
-            <a:r>
-              <a:rPr lang="en-US" sz="2000" dirty="0" smtClean="0"/>
-              <a:t> </a:t>
-            </a:r>
-            <a:r>
-              <a:rPr lang="en-US" sz="3200" dirty="0" err="1"/>
-              <a:t>v</a:t>
-            </a:r>
-            <a:r>
-              <a:rPr lang="en-US" sz="3200" baseline="-25000" dirty="0" err="1" smtClean="0"/>
-              <a:t>m</a:t>
-            </a:r>
-            <a:endParaRPr lang="en-US" sz="3200" dirty="0"/>
-          </a:p>
-        </p:txBody>
-      </p:sp>
-      <p:sp>
-        <p:nvSpPr>
-          <p:cNvPr id="5" name="TextBox 4"/>
-          <p:cNvSpPr txBox="1"/>
-          <p:nvPr/>
-        </p:nvSpPr>
-        <p:spPr>
-          <a:xfrm>
-            <a:off x="4807194" y="4213933"/>
-            <a:ext cx="3454400" cy="584775"/>
-          </a:xfrm>
-          <a:prstGeom prst="rect">
-            <a:avLst/>
-          </a:prstGeom>
-          <a:noFill/>
-        </p:spPr>
-        <p:txBody>
-          <a:bodyPr wrap="square" rtlCol="0">
-            <a:spAutoFit/>
-          </a:bodyPr>
-          <a:lstStyle/>
-          <a:p>
-            <a:r>
-              <a:rPr lang="el-GR" sz="3200" dirty="0" smtClean="0"/>
-              <a:t>Δ</a:t>
-            </a:r>
-            <a:r>
-              <a:rPr lang="en-US" sz="3200" dirty="0" smtClean="0"/>
-              <a:t>M = R</a:t>
-            </a:r>
-            <a:r>
-              <a:rPr lang="en-US" sz="2000" dirty="0" smtClean="0"/>
-              <a:t> </a:t>
-            </a:r>
-            <a:r>
-              <a:rPr lang="en-US" sz="3200" dirty="0" smtClean="0"/>
-              <a:t>(</a:t>
-            </a:r>
-            <a:r>
-              <a:rPr lang="en-US" sz="3200" dirty="0" err="1" smtClean="0"/>
-              <a:t>m</a:t>
-            </a:r>
-            <a:r>
-              <a:rPr lang="en-US" sz="3200" baseline="-25000" dirty="0" err="1" smtClean="0"/>
-              <a:t>b</a:t>
-            </a:r>
-            <a:r>
-              <a:rPr lang="en-US" sz="2000" baseline="-25000" dirty="0" smtClean="0"/>
-              <a:t> </a:t>
-            </a:r>
-            <a:r>
-              <a:rPr lang="en-US" sz="3200" dirty="0" smtClean="0"/>
-              <a:t>+</a:t>
-            </a:r>
-            <a:r>
-              <a:rPr lang="en-US" sz="2000" dirty="0" smtClean="0"/>
-              <a:t> </a:t>
-            </a:r>
-            <a:r>
-              <a:rPr lang="en-US" sz="3200" dirty="0" smtClean="0"/>
-              <a:t>m</a:t>
-            </a:r>
-            <a:r>
-              <a:rPr lang="en-US" sz="3200" baseline="-25000" dirty="0" smtClean="0"/>
-              <a:t>c</a:t>
-            </a:r>
-            <a:r>
-              <a:rPr lang="en-US" sz="3200" dirty="0"/>
-              <a:t>)</a:t>
-            </a:r>
-          </a:p>
-        </p:txBody>
-      </p:sp>
-      <p:sp>
-        <p:nvSpPr>
           <p:cNvPr id="7" name="TextBox 6"/>
           <p:cNvSpPr txBox="1"/>
           <p:nvPr/>
@@ -3821,221 +3676,6 @@
             <a:r>
               <a:rPr lang="en-US" sz="2000" dirty="0" smtClean="0"/>
               <a:t>Total system velocity</a:t>
-            </a:r>
-            <a:endParaRPr lang="en-US" sz="2000" dirty="0"/>
-          </a:p>
-        </p:txBody>
-      </p:sp>
-      <p:sp>
-        <p:nvSpPr>
-          <p:cNvPr id="13" name="TextBox 12"/>
-          <p:cNvSpPr txBox="1"/>
-          <p:nvPr/>
-        </p:nvSpPr>
-        <p:spPr>
-          <a:xfrm>
-            <a:off x="734314" y="4957745"/>
-            <a:ext cx="1272675" cy="707886"/>
-          </a:xfrm>
-          <a:prstGeom prst="rect">
-            <a:avLst/>
-          </a:prstGeom>
-          <a:noFill/>
-        </p:spPr>
-        <p:txBody>
-          <a:bodyPr wrap="square" rtlCol="0">
-            <a:spAutoFit/>
-          </a:bodyPr>
-          <a:lstStyle/>
-          <a:p>
-            <a:pPr algn="ctr"/>
-            <a:r>
-              <a:rPr lang="en-US" sz="2000" dirty="0" smtClean="0"/>
-              <a:t>Mass of one bullet</a:t>
-            </a:r>
-            <a:endParaRPr lang="en-US" sz="2000" dirty="0"/>
-          </a:p>
-        </p:txBody>
-      </p:sp>
-      <p:sp>
-        <p:nvSpPr>
-          <p:cNvPr id="14" name="TextBox 13"/>
-          <p:cNvSpPr txBox="1"/>
-          <p:nvPr/>
-        </p:nvSpPr>
-        <p:spPr>
-          <a:xfrm>
-            <a:off x="1856260" y="3778441"/>
-            <a:ext cx="2021305" cy="400110"/>
-          </a:xfrm>
-          <a:prstGeom prst="rect">
-            <a:avLst/>
-          </a:prstGeom>
-          <a:noFill/>
-        </p:spPr>
-        <p:txBody>
-          <a:bodyPr wrap="square" rtlCol="0">
-            <a:spAutoFit/>
-          </a:bodyPr>
-          <a:lstStyle/>
-          <a:p>
-            <a:r>
-              <a:rPr lang="en-US" sz="2000" dirty="0" smtClean="0"/>
-              <a:t>Rate of fire</a:t>
-            </a:r>
-            <a:endParaRPr lang="en-US" sz="2000" dirty="0"/>
-          </a:p>
-        </p:txBody>
-      </p:sp>
-      <p:sp>
-        <p:nvSpPr>
-          <p:cNvPr id="15" name="TextBox 14"/>
-          <p:cNvSpPr txBox="1"/>
-          <p:nvPr/>
-        </p:nvSpPr>
-        <p:spPr>
-          <a:xfrm>
-            <a:off x="2646860" y="4957745"/>
-            <a:ext cx="1809549" cy="707886"/>
-          </a:xfrm>
-          <a:prstGeom prst="rect">
-            <a:avLst/>
-          </a:prstGeom>
-          <a:noFill/>
-        </p:spPr>
-        <p:txBody>
-          <a:bodyPr wrap="square" rtlCol="0">
-            <a:spAutoFit/>
-          </a:bodyPr>
-          <a:lstStyle/>
-          <a:p>
-            <a:pPr algn="ctr"/>
-            <a:r>
-              <a:rPr lang="en-US" sz="2000" dirty="0" smtClean="0"/>
-              <a:t>Muzzle velocity of bullet</a:t>
-            </a:r>
-            <a:endParaRPr lang="en-US" sz="2000" dirty="0"/>
-          </a:p>
-        </p:txBody>
-      </p:sp>
-      <p:sp>
-        <p:nvSpPr>
-          <p:cNvPr id="16" name="TextBox 15"/>
-          <p:cNvSpPr txBox="1"/>
-          <p:nvPr/>
-        </p:nvSpPr>
-        <p:spPr>
-          <a:xfrm>
-            <a:off x="4877332" y="4957745"/>
-            <a:ext cx="2051341" cy="400110"/>
-          </a:xfrm>
-          <a:prstGeom prst="rect">
-            <a:avLst/>
-          </a:prstGeom>
-          <a:noFill/>
-        </p:spPr>
-        <p:txBody>
-          <a:bodyPr wrap="square" rtlCol="0">
-            <a:spAutoFit/>
-          </a:bodyPr>
-          <a:lstStyle/>
-          <a:p>
-            <a:r>
-              <a:rPr lang="en-US" sz="2000" dirty="0" smtClean="0"/>
-              <a:t>Rate of fire</a:t>
-            </a:r>
-            <a:endParaRPr lang="en-US" sz="2000" dirty="0"/>
-          </a:p>
-        </p:txBody>
-      </p:sp>
-      <p:sp>
-        <p:nvSpPr>
-          <p:cNvPr id="17" name="TextBox 16"/>
-          <p:cNvSpPr txBox="1"/>
-          <p:nvPr/>
-        </p:nvSpPr>
-        <p:spPr>
-          <a:xfrm>
-            <a:off x="6589608" y="3513378"/>
-            <a:ext cx="1727200" cy="707886"/>
-          </a:xfrm>
-          <a:prstGeom prst="rect">
-            <a:avLst/>
-          </a:prstGeom>
-          <a:noFill/>
-        </p:spPr>
-        <p:txBody>
-          <a:bodyPr wrap="square" rtlCol="0">
-            <a:spAutoFit/>
-          </a:bodyPr>
-          <a:lstStyle/>
-          <a:p>
-            <a:pPr algn="ctr"/>
-            <a:r>
-              <a:rPr lang="en-US" sz="2000" dirty="0" smtClean="0"/>
-              <a:t>Mass of one bullet</a:t>
-            </a:r>
-            <a:endParaRPr lang="en-US" sz="2000" dirty="0"/>
-          </a:p>
-        </p:txBody>
-      </p:sp>
-      <p:sp>
-        <p:nvSpPr>
-          <p:cNvPr id="18" name="TextBox 17"/>
-          <p:cNvSpPr txBox="1"/>
-          <p:nvPr/>
-        </p:nvSpPr>
-        <p:spPr>
-          <a:xfrm>
-            <a:off x="6939368" y="4957745"/>
-            <a:ext cx="2098307" cy="707886"/>
-          </a:xfrm>
-          <a:prstGeom prst="rect">
-            <a:avLst/>
-          </a:prstGeom>
-          <a:noFill/>
-        </p:spPr>
-        <p:txBody>
-          <a:bodyPr wrap="square" rtlCol="0">
-            <a:spAutoFit/>
-          </a:bodyPr>
-          <a:lstStyle/>
-          <a:p>
-            <a:pPr algn="ctr"/>
-            <a:r>
-              <a:rPr lang="en-US" sz="2000" dirty="0" smtClean="0"/>
-              <a:t>Mass of bullet casing</a:t>
-            </a:r>
-            <a:endParaRPr lang="en-US" sz="2000" dirty="0"/>
-          </a:p>
-        </p:txBody>
-      </p:sp>
-      <p:sp>
-        <p:nvSpPr>
-          <p:cNvPr id="19" name="TextBox 18"/>
-          <p:cNvSpPr txBox="1"/>
-          <p:nvPr/>
-        </p:nvSpPr>
-        <p:spPr>
-          <a:xfrm>
-            <a:off x="3721055" y="3504860"/>
-            <a:ext cx="2377440" cy="707886"/>
-          </a:xfrm>
-          <a:prstGeom prst="rect">
-            <a:avLst/>
-          </a:prstGeom>
-          <a:noFill/>
-        </p:spPr>
-        <p:txBody>
-          <a:bodyPr wrap="square" rtlCol="0">
-            <a:spAutoFit/>
-          </a:bodyPr>
-          <a:lstStyle/>
-          <a:p>
-            <a:pPr algn="ctr"/>
-            <a:r>
-              <a:rPr lang="en-US" sz="2000" dirty="0" smtClean="0"/>
-              <a:t>Change in total system mass</a:t>
             </a:r>
             <a:endParaRPr lang="en-US" sz="2000" dirty="0"/>
           </a:p>
@@ -4265,265 +3905,634 @@
           </a:fontRef>
         </p:style>
       </p:cxnSp>
-      <p:cxnSp>
-        <p:nvCxnSpPr>
-          <p:cNvPr id="56" name="Straight Connector 55"/>
-          <p:cNvCxnSpPr/>
+      <p:grpSp>
+        <p:nvGrpSpPr>
+          <p:cNvPr id="6" name="Group 5"/>
+          <p:cNvGrpSpPr/>
           <p:nvPr/>
-        </p:nvCxnSpPr>
-        <p:spPr>
-          <a:xfrm flipH="1" flipV="1">
-            <a:off x="2111674" y="4114800"/>
-            <a:ext cx="208771" cy="212929"/>
+        </p:nvGrpSpPr>
+        <p:grpSpPr>
+          <a:xfrm>
+            <a:off x="754937" y="3140794"/>
+            <a:ext cx="8303361" cy="2160771"/>
+            <a:chOff x="734314" y="3504860"/>
+            <a:chExt cx="8303361" cy="2160771"/>
           </a:xfrm>
-          <a:prstGeom prst="line">
-            <a:avLst/>
-          </a:prstGeom>
-          <a:ln w="19050">
-            <a:solidFill>
+        </p:grpSpPr>
+        <p:sp>
+          <p:nvSpPr>
+            <p:cNvPr id="4" name="TextBox 3"/>
+            <p:cNvSpPr txBox="1"/>
+            <p:nvPr/>
+          </p:nvSpPr>
+          <p:spPr>
+            <a:xfrm>
+              <a:off x="970012" y="4212746"/>
+              <a:ext cx="2700867" cy="584775"/>
+            </a:xfrm>
+            <a:prstGeom prst="rect">
+              <a:avLst/>
+            </a:prstGeom>
+            <a:noFill/>
+          </p:spPr>
+          <p:txBody>
+            <a:bodyPr wrap="square" rtlCol="0">
+              <a:spAutoFit/>
+            </a:bodyPr>
+            <a:lstStyle/>
+            <a:p>
+              <a:r>
+                <a:rPr lang="en-US" sz="3200" dirty="0" smtClean="0"/>
+                <a:t>F</a:t>
+              </a:r>
+              <a:r>
+                <a:rPr lang="en-US" sz="3200" baseline="-25000" dirty="0" smtClean="0"/>
+                <a:t>t</a:t>
+              </a:r>
+              <a:r>
+                <a:rPr lang="en-US" sz="3200" dirty="0" smtClean="0"/>
+                <a:t> = </a:t>
+              </a:r>
+              <a:r>
+                <a:rPr lang="en-US" sz="3200" dirty="0" err="1" smtClean="0"/>
+                <a:t>m</a:t>
+              </a:r>
+              <a:r>
+                <a:rPr lang="en-US" sz="3200" baseline="-25000" dirty="0" err="1" smtClean="0"/>
+                <a:t>b</a:t>
+              </a:r>
+              <a:r>
+                <a:rPr lang="en-US" sz="2000" dirty="0" smtClean="0"/>
+                <a:t> </a:t>
+              </a:r>
+              <a:r>
+                <a:rPr lang="en-US" sz="3200" dirty="0" smtClean="0"/>
+                <a:t>R</a:t>
+              </a:r>
+              <a:r>
+                <a:rPr lang="en-US" sz="2000" dirty="0" smtClean="0"/>
+                <a:t> </a:t>
+              </a:r>
+              <a:r>
+                <a:rPr lang="en-US" sz="3200" dirty="0" err="1"/>
+                <a:t>v</a:t>
+              </a:r>
+              <a:r>
+                <a:rPr lang="en-US" sz="3200" baseline="-25000" dirty="0" err="1" smtClean="0"/>
+                <a:t>m</a:t>
+              </a:r>
+              <a:endParaRPr lang="en-US" sz="3200" dirty="0"/>
+            </a:p>
+          </p:txBody>
+        </p:sp>
+        <p:sp>
+          <p:nvSpPr>
+            <p:cNvPr id="5" name="TextBox 4"/>
+            <p:cNvSpPr txBox="1"/>
+            <p:nvPr/>
+          </p:nvSpPr>
+          <p:spPr>
+            <a:xfrm>
+              <a:off x="4807194" y="4213933"/>
+              <a:ext cx="3454400" cy="584775"/>
+            </a:xfrm>
+            <a:prstGeom prst="rect">
+              <a:avLst/>
+            </a:prstGeom>
+            <a:noFill/>
+          </p:spPr>
+          <p:txBody>
+            <a:bodyPr wrap="square" rtlCol="0">
+              <a:spAutoFit/>
+            </a:bodyPr>
+            <a:lstStyle/>
+            <a:p>
+              <a:r>
+                <a:rPr lang="el-GR" sz="3200" dirty="0" smtClean="0"/>
+                <a:t>Δ</a:t>
+              </a:r>
+              <a:r>
+                <a:rPr lang="en-US" sz="3200" dirty="0" smtClean="0"/>
+                <a:t>M = R</a:t>
+              </a:r>
+              <a:r>
+                <a:rPr lang="en-US" sz="2000" dirty="0" smtClean="0"/>
+                <a:t> </a:t>
+              </a:r>
+              <a:r>
+                <a:rPr lang="en-US" sz="3200" dirty="0" smtClean="0"/>
+                <a:t>(</a:t>
+              </a:r>
+              <a:r>
+                <a:rPr lang="en-US" sz="3200" dirty="0" err="1" smtClean="0"/>
+                <a:t>m</a:t>
+              </a:r>
+              <a:r>
+                <a:rPr lang="en-US" sz="3200" baseline="-25000" dirty="0" err="1" smtClean="0"/>
+                <a:t>b</a:t>
+              </a:r>
+              <a:r>
+                <a:rPr lang="en-US" sz="2000" baseline="-25000" dirty="0" smtClean="0"/>
+                <a:t> </a:t>
+              </a:r>
+              <a:r>
+                <a:rPr lang="en-US" sz="3200" dirty="0" smtClean="0"/>
+                <a:t>+</a:t>
+              </a:r>
+              <a:r>
+                <a:rPr lang="en-US" sz="2000" dirty="0" smtClean="0"/>
+                <a:t> </a:t>
+              </a:r>
+              <a:r>
+                <a:rPr lang="en-US" sz="3200" dirty="0" smtClean="0"/>
+                <a:t>m</a:t>
+              </a:r>
+              <a:r>
+                <a:rPr lang="en-US" sz="3200" baseline="-25000" dirty="0" smtClean="0"/>
+                <a:t>c</a:t>
+              </a:r>
+              <a:r>
+                <a:rPr lang="en-US" sz="3200" dirty="0"/>
+                <a:t>)</a:t>
+              </a:r>
+            </a:p>
+          </p:txBody>
+        </p:sp>
+        <p:sp>
+          <p:nvSpPr>
+            <p:cNvPr id="13" name="TextBox 12"/>
+            <p:cNvSpPr txBox="1"/>
+            <p:nvPr/>
+          </p:nvSpPr>
+          <p:spPr>
+            <a:xfrm>
+              <a:off x="734314" y="4957745"/>
+              <a:ext cx="1272675" cy="707886"/>
+            </a:xfrm>
+            <a:prstGeom prst="rect">
+              <a:avLst/>
+            </a:prstGeom>
+            <a:noFill/>
+          </p:spPr>
+          <p:txBody>
+            <a:bodyPr wrap="square" rtlCol="0">
+              <a:spAutoFit/>
+            </a:bodyPr>
+            <a:lstStyle/>
+            <a:p>
+              <a:pPr algn="ctr"/>
+              <a:r>
+                <a:rPr lang="en-US" sz="2000" dirty="0" smtClean="0"/>
+                <a:t>Mass of one bullet</a:t>
+              </a:r>
+              <a:endParaRPr lang="en-US" sz="2000" dirty="0"/>
+            </a:p>
+          </p:txBody>
+        </p:sp>
+        <p:sp>
+          <p:nvSpPr>
+            <p:cNvPr id="14" name="TextBox 13"/>
+            <p:cNvSpPr txBox="1"/>
+            <p:nvPr/>
+          </p:nvSpPr>
+          <p:spPr>
+            <a:xfrm>
+              <a:off x="1856260" y="3778441"/>
+              <a:ext cx="2021305" cy="400110"/>
+            </a:xfrm>
+            <a:prstGeom prst="rect">
+              <a:avLst/>
+            </a:prstGeom>
+            <a:noFill/>
+          </p:spPr>
+          <p:txBody>
+            <a:bodyPr wrap="square" rtlCol="0">
+              <a:spAutoFit/>
+            </a:bodyPr>
+            <a:lstStyle/>
+            <a:p>
+              <a:r>
+                <a:rPr lang="en-US" sz="2000" dirty="0" smtClean="0"/>
+                <a:t>Rate of fire</a:t>
+              </a:r>
+              <a:endParaRPr lang="en-US" sz="2000" dirty="0"/>
+            </a:p>
+          </p:txBody>
+        </p:sp>
+        <p:sp>
+          <p:nvSpPr>
+            <p:cNvPr id="15" name="TextBox 14"/>
+            <p:cNvSpPr txBox="1"/>
+            <p:nvPr/>
+          </p:nvSpPr>
+          <p:spPr>
+            <a:xfrm>
+              <a:off x="2646860" y="4957745"/>
+              <a:ext cx="1809549" cy="707886"/>
+            </a:xfrm>
+            <a:prstGeom prst="rect">
+              <a:avLst/>
+            </a:prstGeom>
+            <a:noFill/>
+          </p:spPr>
+          <p:txBody>
+            <a:bodyPr wrap="square" rtlCol="0">
+              <a:spAutoFit/>
+            </a:bodyPr>
+            <a:lstStyle/>
+            <a:p>
+              <a:pPr algn="ctr"/>
+              <a:r>
+                <a:rPr lang="en-US" sz="2000" dirty="0" smtClean="0"/>
+                <a:t>Muzzle velocity of bullet</a:t>
+              </a:r>
+              <a:endParaRPr lang="en-US" sz="2000" dirty="0"/>
+            </a:p>
+          </p:txBody>
+        </p:sp>
+        <p:sp>
+          <p:nvSpPr>
+            <p:cNvPr id="16" name="TextBox 15"/>
+            <p:cNvSpPr txBox="1"/>
+            <p:nvPr/>
+          </p:nvSpPr>
+          <p:spPr>
+            <a:xfrm>
+              <a:off x="4877332" y="4957745"/>
+              <a:ext cx="2051341" cy="400110"/>
+            </a:xfrm>
+            <a:prstGeom prst="rect">
+              <a:avLst/>
+            </a:prstGeom>
+            <a:noFill/>
+          </p:spPr>
+          <p:txBody>
+            <a:bodyPr wrap="square" rtlCol="0">
+              <a:spAutoFit/>
+            </a:bodyPr>
+            <a:lstStyle/>
+            <a:p>
+              <a:r>
+                <a:rPr lang="en-US" sz="2000" dirty="0" smtClean="0"/>
+                <a:t>Rate of fire</a:t>
+              </a:r>
+              <a:endParaRPr lang="en-US" sz="2000" dirty="0"/>
+            </a:p>
+          </p:txBody>
+        </p:sp>
+        <p:sp>
+          <p:nvSpPr>
+            <p:cNvPr id="17" name="TextBox 16"/>
+            <p:cNvSpPr txBox="1"/>
+            <p:nvPr/>
+          </p:nvSpPr>
+          <p:spPr>
+            <a:xfrm>
+              <a:off x="6589608" y="3513378"/>
+              <a:ext cx="1727200" cy="707886"/>
+            </a:xfrm>
+            <a:prstGeom prst="rect">
+              <a:avLst/>
+            </a:prstGeom>
+            <a:noFill/>
+          </p:spPr>
+          <p:txBody>
+            <a:bodyPr wrap="square" rtlCol="0">
+              <a:spAutoFit/>
+            </a:bodyPr>
+            <a:lstStyle/>
+            <a:p>
+              <a:pPr algn="ctr"/>
+              <a:r>
+                <a:rPr lang="en-US" sz="2000" dirty="0" smtClean="0"/>
+                <a:t>Mass of one bullet</a:t>
+              </a:r>
+              <a:endParaRPr lang="en-US" sz="2000" dirty="0"/>
+            </a:p>
+          </p:txBody>
+        </p:sp>
+        <p:sp>
+          <p:nvSpPr>
+            <p:cNvPr id="18" name="TextBox 17"/>
+            <p:cNvSpPr txBox="1"/>
+            <p:nvPr/>
+          </p:nvSpPr>
+          <p:spPr>
+            <a:xfrm>
+              <a:off x="6939368" y="4957745"/>
+              <a:ext cx="2098307" cy="707886"/>
+            </a:xfrm>
+            <a:prstGeom prst="rect">
+              <a:avLst/>
+            </a:prstGeom>
+            <a:noFill/>
+          </p:spPr>
+          <p:txBody>
+            <a:bodyPr wrap="square" rtlCol="0">
+              <a:spAutoFit/>
+            </a:bodyPr>
+            <a:lstStyle/>
+            <a:p>
+              <a:pPr algn="ctr"/>
+              <a:r>
+                <a:rPr lang="en-US" sz="2000" dirty="0" smtClean="0"/>
+                <a:t>Mass of bullet casing</a:t>
+              </a:r>
+              <a:endParaRPr lang="en-US" sz="2000" dirty="0"/>
+            </a:p>
+          </p:txBody>
+        </p:sp>
+        <p:sp>
+          <p:nvSpPr>
+            <p:cNvPr id="19" name="TextBox 18"/>
+            <p:cNvSpPr txBox="1"/>
+            <p:nvPr/>
+          </p:nvSpPr>
+          <p:spPr>
+            <a:xfrm>
+              <a:off x="3721055" y="3504860"/>
+              <a:ext cx="2377440" cy="707886"/>
+            </a:xfrm>
+            <a:prstGeom prst="rect">
+              <a:avLst/>
+            </a:prstGeom>
+            <a:noFill/>
+          </p:spPr>
+          <p:txBody>
+            <a:bodyPr wrap="square" rtlCol="0">
+              <a:spAutoFit/>
+            </a:bodyPr>
+            <a:lstStyle/>
+            <a:p>
+              <a:pPr algn="ctr"/>
+              <a:r>
+                <a:rPr lang="en-US" sz="2000" dirty="0" smtClean="0"/>
+                <a:t>Change in total system mass</a:t>
+              </a:r>
+              <a:endParaRPr lang="en-US" sz="2000" dirty="0"/>
+            </a:p>
+          </p:txBody>
+        </p:sp>
+        <p:cxnSp>
+          <p:nvCxnSpPr>
+            <p:cNvPr id="56" name="Straight Connector 55"/>
+            <p:cNvCxnSpPr/>
+            <p:nvPr/>
+          </p:nvCxnSpPr>
+          <p:spPr>
+            <a:xfrm flipH="1" flipV="1">
+              <a:off x="2111674" y="4114800"/>
+              <a:ext cx="208771" cy="212929"/>
+            </a:xfrm>
+            <a:prstGeom prst="line">
+              <a:avLst/>
+            </a:prstGeom>
+            <a:ln w="19050">
+              <a:solidFill>
+                <a:schemeClr val="tx1"/>
+              </a:solidFill>
+              <a:headEnd type="triangle"/>
+              <a:tailEnd type="none" w="sm" len="med"/>
+            </a:ln>
+          </p:spPr>
+          <p:style>
+            <a:lnRef idx="1">
+              <a:schemeClr val="accent1"/>
+            </a:lnRef>
+            <a:fillRef idx="0">
+              <a:schemeClr val="accent1"/>
+            </a:fillRef>
+            <a:effectRef idx="0">
+              <a:schemeClr val="accent1"/>
+            </a:effectRef>
+            <a:fontRef idx="minor">
               <a:schemeClr val="tx1"/>
-            </a:solidFill>
-            <a:headEnd type="triangle"/>
-            <a:tailEnd type="none" w="sm" len="med"/>
-          </a:ln>
-        </p:spPr>
-        <p:style>
-          <a:lnRef idx="1">
-            <a:schemeClr val="accent1"/>
-          </a:lnRef>
-          <a:fillRef idx="0">
-            <a:schemeClr val="accent1"/>
-          </a:fillRef>
-          <a:effectRef idx="0">
-            <a:schemeClr val="accent1"/>
-          </a:effectRef>
-          <a:fontRef idx="minor">
-            <a:schemeClr val="tx1"/>
-          </a:fontRef>
-        </p:style>
-      </p:cxnSp>
-      <p:cxnSp>
-        <p:nvCxnSpPr>
-          <p:cNvPr id="62" name="Straight Connector 61"/>
-          <p:cNvCxnSpPr/>
-          <p:nvPr/>
-        </p:nvCxnSpPr>
-        <p:spPr>
-          <a:xfrm flipH="1">
-            <a:off x="1346200" y="4740143"/>
-            <a:ext cx="406400" cy="289057"/>
-          </a:xfrm>
-          <a:prstGeom prst="line">
-            <a:avLst/>
-          </a:prstGeom>
-          <a:ln w="19050">
-            <a:solidFill>
+            </a:fontRef>
+          </p:style>
+        </p:cxnSp>
+        <p:cxnSp>
+          <p:nvCxnSpPr>
+            <p:cNvPr id="62" name="Straight Connector 61"/>
+            <p:cNvCxnSpPr/>
+            <p:nvPr/>
+          </p:nvCxnSpPr>
+          <p:spPr>
+            <a:xfrm flipH="1">
+              <a:off x="1346200" y="4740143"/>
+              <a:ext cx="406400" cy="289057"/>
+            </a:xfrm>
+            <a:prstGeom prst="line">
+              <a:avLst/>
+            </a:prstGeom>
+            <a:ln w="19050">
+              <a:solidFill>
+                <a:schemeClr val="tx1"/>
+              </a:solidFill>
+              <a:headEnd type="triangle"/>
+              <a:tailEnd type="none" w="sm" len="med"/>
+            </a:ln>
+          </p:spPr>
+          <p:style>
+            <a:lnRef idx="1">
+              <a:schemeClr val="accent1"/>
+            </a:lnRef>
+            <a:fillRef idx="0">
+              <a:schemeClr val="accent1"/>
+            </a:fillRef>
+            <a:effectRef idx="0">
+              <a:schemeClr val="accent1"/>
+            </a:effectRef>
+            <a:fontRef idx="minor">
               <a:schemeClr val="tx1"/>
-            </a:solidFill>
-            <a:headEnd type="triangle"/>
-            <a:tailEnd type="none" w="sm" len="med"/>
-          </a:ln>
-        </p:spPr>
-        <p:style>
-          <a:lnRef idx="1">
-            <a:schemeClr val="accent1"/>
-          </a:lnRef>
-          <a:fillRef idx="0">
-            <a:schemeClr val="accent1"/>
-          </a:fillRef>
-          <a:effectRef idx="0">
-            <a:schemeClr val="accent1"/>
-          </a:effectRef>
-          <a:fontRef idx="minor">
-            <a:schemeClr val="tx1"/>
-          </a:fontRef>
-        </p:style>
-      </p:cxnSp>
-      <p:cxnSp>
-        <p:nvCxnSpPr>
-          <p:cNvPr id="66" name="Straight Connector 65"/>
-          <p:cNvCxnSpPr/>
-          <p:nvPr/>
-        </p:nvCxnSpPr>
-        <p:spPr>
-          <a:xfrm>
-            <a:off x="2618875" y="4740143"/>
-            <a:ext cx="54456" cy="417657"/>
-          </a:xfrm>
-          <a:prstGeom prst="line">
-            <a:avLst/>
-          </a:prstGeom>
-          <a:ln w="19050">
-            <a:solidFill>
+            </a:fontRef>
+          </p:style>
+        </p:cxnSp>
+        <p:cxnSp>
+          <p:nvCxnSpPr>
+            <p:cNvPr id="66" name="Straight Connector 65"/>
+            <p:cNvCxnSpPr/>
+            <p:nvPr/>
+          </p:nvCxnSpPr>
+          <p:spPr>
+            <a:xfrm>
+              <a:off x="2618875" y="4740143"/>
+              <a:ext cx="54456" cy="417657"/>
+            </a:xfrm>
+            <a:prstGeom prst="line">
+              <a:avLst/>
+            </a:prstGeom>
+            <a:ln w="19050">
+              <a:solidFill>
+                <a:schemeClr val="tx1"/>
+              </a:solidFill>
+              <a:headEnd type="triangle"/>
+              <a:tailEnd type="none" w="sm" len="med"/>
+            </a:ln>
+          </p:spPr>
+          <p:style>
+            <a:lnRef idx="1">
+              <a:schemeClr val="accent1"/>
+            </a:lnRef>
+            <a:fillRef idx="0">
+              <a:schemeClr val="accent1"/>
+            </a:fillRef>
+            <a:effectRef idx="0">
+              <a:schemeClr val="accent1"/>
+            </a:effectRef>
+            <a:fontRef idx="minor">
               <a:schemeClr val="tx1"/>
-            </a:solidFill>
-            <a:headEnd type="triangle"/>
-            <a:tailEnd type="none" w="sm" len="med"/>
-          </a:ln>
-        </p:spPr>
-        <p:style>
-          <a:lnRef idx="1">
-            <a:schemeClr val="accent1"/>
-          </a:lnRef>
-          <a:fillRef idx="0">
-            <a:schemeClr val="accent1"/>
-          </a:fillRef>
-          <a:effectRef idx="0">
-            <a:schemeClr val="accent1"/>
-          </a:effectRef>
-          <a:fontRef idx="minor">
-            <a:schemeClr val="tx1"/>
-          </a:fontRef>
-        </p:style>
-      </p:cxnSp>
-      <p:cxnSp>
-        <p:nvCxnSpPr>
-          <p:cNvPr id="70" name="Straight Connector 69"/>
-          <p:cNvCxnSpPr/>
-          <p:nvPr/>
-        </p:nvCxnSpPr>
-        <p:spPr>
-          <a:xfrm flipH="1" flipV="1">
-            <a:off x="4593346" y="4169262"/>
-            <a:ext cx="316429" cy="246376"/>
-          </a:xfrm>
-          <a:prstGeom prst="line">
-            <a:avLst/>
-          </a:prstGeom>
-          <a:ln w="19050">
-            <a:solidFill>
+            </a:fontRef>
+          </p:style>
+        </p:cxnSp>
+        <p:cxnSp>
+          <p:nvCxnSpPr>
+            <p:cNvPr id="70" name="Straight Connector 69"/>
+            <p:cNvCxnSpPr/>
+            <p:nvPr/>
+          </p:nvCxnSpPr>
+          <p:spPr>
+            <a:xfrm flipH="1" flipV="1">
+              <a:off x="4593346" y="4169262"/>
+              <a:ext cx="316429" cy="246376"/>
+            </a:xfrm>
+            <a:prstGeom prst="line">
+              <a:avLst/>
+            </a:prstGeom>
+            <a:ln w="19050">
+              <a:solidFill>
+                <a:schemeClr val="tx1"/>
+              </a:solidFill>
+              <a:headEnd type="triangle"/>
+              <a:tailEnd type="none" w="sm" len="med"/>
+            </a:ln>
+          </p:spPr>
+          <p:style>
+            <a:lnRef idx="1">
+              <a:schemeClr val="accent1"/>
+            </a:lnRef>
+            <a:fillRef idx="0">
+              <a:schemeClr val="accent1"/>
+            </a:fillRef>
+            <a:effectRef idx="0">
+              <a:schemeClr val="accent1"/>
+            </a:effectRef>
+            <a:fontRef idx="minor">
               <a:schemeClr val="tx1"/>
-            </a:solidFill>
-            <a:headEnd type="triangle"/>
-            <a:tailEnd type="none" w="sm" len="med"/>
-          </a:ln>
-        </p:spPr>
-        <p:style>
-          <a:lnRef idx="1">
-            <a:schemeClr val="accent1"/>
-          </a:lnRef>
-          <a:fillRef idx="0">
-            <a:schemeClr val="accent1"/>
-          </a:fillRef>
-          <a:effectRef idx="0">
-            <a:schemeClr val="accent1"/>
-          </a:effectRef>
-          <a:fontRef idx="minor">
-            <a:schemeClr val="tx1"/>
-          </a:fontRef>
-        </p:style>
-      </p:cxnSp>
-      <p:cxnSp>
-        <p:nvCxnSpPr>
-          <p:cNvPr id="73" name="Straight Connector 72"/>
-          <p:cNvCxnSpPr/>
-          <p:nvPr/>
-        </p:nvCxnSpPr>
-        <p:spPr>
-          <a:xfrm flipH="1">
-            <a:off x="5503736" y="4679870"/>
-            <a:ext cx="399266" cy="334070"/>
-          </a:xfrm>
-          <a:prstGeom prst="line">
-            <a:avLst/>
-          </a:prstGeom>
-          <a:ln w="19050">
-            <a:solidFill>
+            </a:fontRef>
+          </p:style>
+        </p:cxnSp>
+        <p:cxnSp>
+          <p:nvCxnSpPr>
+            <p:cNvPr id="73" name="Straight Connector 72"/>
+            <p:cNvCxnSpPr/>
+            <p:nvPr/>
+          </p:nvCxnSpPr>
+          <p:spPr>
+            <a:xfrm flipH="1">
+              <a:off x="5503736" y="4679870"/>
+              <a:ext cx="399266" cy="334070"/>
+            </a:xfrm>
+            <a:prstGeom prst="line">
+              <a:avLst/>
+            </a:prstGeom>
+            <a:ln w="19050">
+              <a:solidFill>
+                <a:schemeClr val="tx1"/>
+              </a:solidFill>
+              <a:headEnd type="triangle"/>
+              <a:tailEnd type="none" w="sm" len="med"/>
+            </a:ln>
+          </p:spPr>
+          <p:style>
+            <a:lnRef idx="1">
+              <a:schemeClr val="accent1"/>
+            </a:lnRef>
+            <a:fillRef idx="0">
+              <a:schemeClr val="accent1"/>
+            </a:fillRef>
+            <a:effectRef idx="0">
+              <a:schemeClr val="accent1"/>
+            </a:effectRef>
+            <a:fontRef idx="minor">
               <a:schemeClr val="tx1"/>
-            </a:solidFill>
-            <a:headEnd type="triangle"/>
-            <a:tailEnd type="none" w="sm" len="med"/>
-          </a:ln>
-        </p:spPr>
-        <p:style>
-          <a:lnRef idx="1">
-            <a:schemeClr val="accent1"/>
-          </a:lnRef>
-          <a:fillRef idx="0">
-            <a:schemeClr val="accent1"/>
-          </a:fillRef>
-          <a:effectRef idx="0">
-            <a:schemeClr val="accent1"/>
-          </a:effectRef>
-          <a:fontRef idx="minor">
-            <a:schemeClr val="tx1"/>
-          </a:fontRef>
-        </p:style>
-      </p:cxnSp>
-      <p:cxnSp>
-        <p:nvCxnSpPr>
-          <p:cNvPr id="77" name="Straight Connector 76"/>
-          <p:cNvCxnSpPr/>
-          <p:nvPr/>
-        </p:nvCxnSpPr>
-        <p:spPr>
-          <a:xfrm flipV="1">
-            <a:off x="6443136" y="3867321"/>
-            <a:ext cx="496232" cy="473375"/>
-          </a:xfrm>
-          <a:prstGeom prst="line">
-            <a:avLst/>
-          </a:prstGeom>
-          <a:ln w="19050">
-            <a:solidFill>
+            </a:fontRef>
+          </p:style>
+        </p:cxnSp>
+        <p:cxnSp>
+          <p:nvCxnSpPr>
+            <p:cNvPr id="77" name="Straight Connector 76"/>
+            <p:cNvCxnSpPr/>
+            <p:nvPr/>
+          </p:nvCxnSpPr>
+          <p:spPr>
+            <a:xfrm flipV="1">
+              <a:off x="6443136" y="3867321"/>
+              <a:ext cx="496232" cy="473375"/>
+            </a:xfrm>
+            <a:prstGeom prst="line">
+              <a:avLst/>
+            </a:prstGeom>
+            <a:ln w="19050">
+              <a:solidFill>
+                <a:schemeClr val="tx1"/>
+              </a:solidFill>
+              <a:headEnd type="triangle"/>
+              <a:tailEnd type="none" w="sm" len="med"/>
+            </a:ln>
+          </p:spPr>
+          <p:style>
+            <a:lnRef idx="1">
+              <a:schemeClr val="accent1"/>
+            </a:lnRef>
+            <a:fillRef idx="0">
+              <a:schemeClr val="accent1"/>
+            </a:fillRef>
+            <a:effectRef idx="0">
+              <a:schemeClr val="accent1"/>
+            </a:effectRef>
+            <a:fontRef idx="minor">
               <a:schemeClr val="tx1"/>
-            </a:solidFill>
-            <a:headEnd type="triangle"/>
-            <a:tailEnd type="none" w="sm" len="med"/>
-          </a:ln>
-        </p:spPr>
-        <p:style>
-          <a:lnRef idx="1">
-            <a:schemeClr val="accent1"/>
-          </a:lnRef>
-          <a:fillRef idx="0">
-            <a:schemeClr val="accent1"/>
-          </a:fillRef>
-          <a:effectRef idx="0">
-            <a:schemeClr val="accent1"/>
-          </a:effectRef>
-          <a:fontRef idx="minor">
-            <a:schemeClr val="tx1"/>
-          </a:fontRef>
-        </p:style>
-      </p:cxnSp>
-      <p:cxnSp>
-        <p:nvCxnSpPr>
-          <p:cNvPr id="81" name="Straight Connector 80"/>
-          <p:cNvCxnSpPr/>
-          <p:nvPr/>
-        </p:nvCxnSpPr>
-        <p:spPr>
-          <a:xfrm>
-            <a:off x="7142726" y="4677947"/>
-            <a:ext cx="80008" cy="335993"/>
-          </a:xfrm>
-          <a:prstGeom prst="line">
-            <a:avLst/>
-          </a:prstGeom>
-          <a:ln w="19050">
-            <a:solidFill>
+            </a:fontRef>
+          </p:style>
+        </p:cxnSp>
+        <p:cxnSp>
+          <p:nvCxnSpPr>
+            <p:cNvPr id="81" name="Straight Connector 80"/>
+            <p:cNvCxnSpPr/>
+            <p:nvPr/>
+          </p:nvCxnSpPr>
+          <p:spPr>
+            <a:xfrm>
+              <a:off x="7142726" y="4677947"/>
+              <a:ext cx="80008" cy="335993"/>
+            </a:xfrm>
+            <a:prstGeom prst="line">
+              <a:avLst/>
+            </a:prstGeom>
+            <a:ln w="19050">
+              <a:solidFill>
+                <a:schemeClr val="tx1"/>
+              </a:solidFill>
+              <a:headEnd type="triangle"/>
+              <a:tailEnd type="none" w="sm" len="med"/>
+            </a:ln>
+          </p:spPr>
+          <p:style>
+            <a:lnRef idx="1">
+              <a:schemeClr val="accent1"/>
+            </a:lnRef>
+            <a:fillRef idx="0">
+              <a:schemeClr val="accent1"/>
+            </a:fillRef>
+            <a:effectRef idx="0">
+              <a:schemeClr val="accent1"/>
+            </a:effectRef>
+            <a:fontRef idx="minor">
               <a:schemeClr val="tx1"/>
-            </a:solidFill>
-            <a:headEnd type="triangle"/>
-            <a:tailEnd type="none" w="sm" len="med"/>
-          </a:ln>
-        </p:spPr>
-        <p:style>
-          <a:lnRef idx="1">
-            <a:schemeClr val="accent1"/>
-          </a:lnRef>
-          <a:fillRef idx="0">
-            <a:schemeClr val="accent1"/>
-          </a:fillRef>
-          <a:effectRef idx="0">
-            <a:schemeClr val="accent1"/>
-          </a:effectRef>
-          <a:fontRef idx="minor">
-            <a:schemeClr val="tx1"/>
-          </a:fontRef>
-        </p:style>
-      </p:cxnSp>
+            </a:fontRef>
+          </p:style>
+        </p:cxnSp>
+      </p:grpSp>
     </p:spTree>
     <p:extLst>
       <p:ext uri="{BB962C8B-B14F-4D97-AF65-F5344CB8AC3E}">

</xml_diff>

<commit_message>
Increased font size on force equation callouts
</commit_message>
<xml_diff>
--- a/Forces used.pptx
+++ b/Forces used.pptx
@@ -244,7 +244,7 @@
           <a:p>
             <a:fld id="{282601F8-67E4-4DA2-919C-30A0AE44C704}" type="datetimeFigureOut">
               <a:rPr lang="en-US" smtClean="0"/>
-              <a:t>12/5/2016</a:t>
+              <a:t>12/6/2016</a:t>
             </a:fld>
             <a:endParaRPr lang="en-US"/>
           </a:p>
@@ -414,7 +414,7 @@
           <a:p>
             <a:fld id="{282601F8-67E4-4DA2-919C-30A0AE44C704}" type="datetimeFigureOut">
               <a:rPr lang="en-US" smtClean="0"/>
-              <a:t>12/5/2016</a:t>
+              <a:t>12/6/2016</a:t>
             </a:fld>
             <a:endParaRPr lang="en-US"/>
           </a:p>
@@ -594,7 +594,7 @@
           <a:p>
             <a:fld id="{282601F8-67E4-4DA2-919C-30A0AE44C704}" type="datetimeFigureOut">
               <a:rPr lang="en-US" smtClean="0"/>
-              <a:t>12/5/2016</a:t>
+              <a:t>12/6/2016</a:t>
             </a:fld>
             <a:endParaRPr lang="en-US"/>
           </a:p>
@@ -764,7 +764,7 @@
           <a:p>
             <a:fld id="{282601F8-67E4-4DA2-919C-30A0AE44C704}" type="datetimeFigureOut">
               <a:rPr lang="en-US" smtClean="0"/>
-              <a:t>12/5/2016</a:t>
+              <a:t>12/6/2016</a:t>
             </a:fld>
             <a:endParaRPr lang="en-US"/>
           </a:p>
@@ -1008,7 +1008,7 @@
           <a:p>
             <a:fld id="{282601F8-67E4-4DA2-919C-30A0AE44C704}" type="datetimeFigureOut">
               <a:rPr lang="en-US" smtClean="0"/>
-              <a:t>12/5/2016</a:t>
+              <a:t>12/6/2016</a:t>
             </a:fld>
             <a:endParaRPr lang="en-US"/>
           </a:p>
@@ -1240,7 +1240,7 @@
           <a:p>
             <a:fld id="{282601F8-67E4-4DA2-919C-30A0AE44C704}" type="datetimeFigureOut">
               <a:rPr lang="en-US" smtClean="0"/>
-              <a:t>12/5/2016</a:t>
+              <a:t>12/6/2016</a:t>
             </a:fld>
             <a:endParaRPr lang="en-US"/>
           </a:p>
@@ -1607,7 +1607,7 @@
           <a:p>
             <a:fld id="{282601F8-67E4-4DA2-919C-30A0AE44C704}" type="datetimeFigureOut">
               <a:rPr lang="en-US" smtClean="0"/>
-              <a:t>12/5/2016</a:t>
+              <a:t>12/6/2016</a:t>
             </a:fld>
             <a:endParaRPr lang="en-US"/>
           </a:p>
@@ -1725,7 +1725,7 @@
           <a:p>
             <a:fld id="{282601F8-67E4-4DA2-919C-30A0AE44C704}" type="datetimeFigureOut">
               <a:rPr lang="en-US" smtClean="0"/>
-              <a:t>12/5/2016</a:t>
+              <a:t>12/6/2016</a:t>
             </a:fld>
             <a:endParaRPr lang="en-US"/>
           </a:p>
@@ -1820,7 +1820,7 @@
           <a:p>
             <a:fld id="{282601F8-67E4-4DA2-919C-30A0AE44C704}" type="datetimeFigureOut">
               <a:rPr lang="en-US" smtClean="0"/>
-              <a:t>12/5/2016</a:t>
+              <a:t>12/6/2016</a:t>
             </a:fld>
             <a:endParaRPr lang="en-US"/>
           </a:p>
@@ -2097,7 +2097,7 @@
           <a:p>
             <a:fld id="{282601F8-67E4-4DA2-919C-30A0AE44C704}" type="datetimeFigureOut">
               <a:rPr lang="en-US" smtClean="0"/>
-              <a:t>12/5/2016</a:t>
+              <a:t>12/6/2016</a:t>
             </a:fld>
             <a:endParaRPr lang="en-US"/>
           </a:p>
@@ -2354,7 +2354,7 @@
           <a:p>
             <a:fld id="{282601F8-67E4-4DA2-919C-30A0AE44C704}" type="datetimeFigureOut">
               <a:rPr lang="en-US" smtClean="0"/>
-              <a:t>12/5/2016</a:t>
+              <a:t>12/6/2016</a:t>
             </a:fld>
             <a:endParaRPr lang="en-US"/>
           </a:p>
@@ -2567,7 +2567,7 @@
           <a:p>
             <a:fld id="{282601F8-67E4-4DA2-919C-30A0AE44C704}" type="datetimeFigureOut">
               <a:rPr lang="en-US" smtClean="0"/>
-              <a:t>12/5/2016</a:t>
+              <a:t>12/6/2016</a:t>
             </a:fld>
             <a:endParaRPr lang="en-US"/>
           </a:p>
@@ -3382,7 +3382,7 @@
         </p:nvSpPr>
         <p:spPr>
           <a:xfrm>
-            <a:off x="970012" y="1437294"/>
+            <a:off x="686548" y="1172118"/>
             <a:ext cx="2929467" cy="584775"/>
           </a:xfrm>
           <a:prstGeom prst="rect">
@@ -3428,7 +3428,7 @@
         </p:nvSpPr>
         <p:spPr>
           <a:xfrm>
-            <a:off x="5205127" y="1437294"/>
+            <a:off x="4921663" y="1172118"/>
             <a:ext cx="3056467" cy="584775"/>
           </a:xfrm>
           <a:prstGeom prst="rect">
@@ -3506,8 +3506,8 @@
         </p:nvSpPr>
         <p:spPr>
           <a:xfrm>
-            <a:off x="2111674" y="969280"/>
-            <a:ext cx="2377440" cy="400110"/>
+            <a:off x="1828209" y="704104"/>
+            <a:ext cx="2502295" cy="461665"/>
           </a:xfrm>
           <a:prstGeom prst="rect">
             <a:avLst/>
@@ -3521,10 +3521,10 @@
           <a:lstStyle/>
           <a:p>
             <a:r>
-              <a:rPr lang="en-US" sz="2000" dirty="0" smtClean="0"/>
+              <a:rPr lang="en-US" sz="2400" dirty="0" smtClean="0"/>
               <a:t>Total system mass</a:t>
             </a:r>
-            <a:endParaRPr lang="en-US" sz="2000" dirty="0"/>
+            <a:endParaRPr lang="en-US" sz="2400" dirty="0"/>
           </a:p>
         </p:txBody>
       </p:sp>
@@ -3536,8 +3536,8 @@
         </p:nvSpPr>
         <p:spPr>
           <a:xfrm>
-            <a:off x="2151130" y="2115377"/>
-            <a:ext cx="1519749" cy="707886"/>
+            <a:off x="1867666" y="1850201"/>
+            <a:ext cx="1817366" cy="830997"/>
           </a:xfrm>
           <a:prstGeom prst="rect">
             <a:avLst/>
@@ -3552,10 +3552,10 @@
           <a:p>
             <a:pPr algn="ctr"/>
             <a:r>
-              <a:rPr lang="en-US" sz="2000" dirty="0" smtClean="0"/>
+              <a:rPr lang="en-US" sz="2400" dirty="0" smtClean="0"/>
               <a:t>Gravitational constant</a:t>
             </a:r>
-            <a:endParaRPr lang="en-US" sz="2000" dirty="0"/>
+            <a:endParaRPr lang="en-US" sz="2400" dirty="0"/>
           </a:p>
         </p:txBody>
       </p:sp>
@@ -3567,8 +3567,8 @@
         </p:nvSpPr>
         <p:spPr>
           <a:xfrm>
-            <a:off x="4877332" y="661990"/>
-            <a:ext cx="1752958" cy="707886"/>
+            <a:off x="4482606" y="202588"/>
+            <a:ext cx="2101783" cy="830997"/>
           </a:xfrm>
           <a:prstGeom prst="rect">
             <a:avLst/>
@@ -3583,7 +3583,7 @@
           <a:p>
             <a:pPr algn="ctr"/>
             <a:r>
-              <a:rPr lang="en-US" sz="2000" dirty="0" smtClean="0"/>
+              <a:rPr lang="en-US" sz="2400" dirty="0" smtClean="0"/>
               <a:t>Effective area of sphere</a:t>
             </a:r>
           </a:p>
@@ -3597,8 +3597,8 @@
         </p:nvSpPr>
         <p:spPr>
           <a:xfrm>
-            <a:off x="5140514" y="2110298"/>
-            <a:ext cx="2780454" cy="400110"/>
+            <a:off x="4857050" y="1845122"/>
+            <a:ext cx="2780454" cy="461665"/>
           </a:xfrm>
           <a:prstGeom prst="rect">
             <a:avLst/>
@@ -3612,10 +3612,10 @@
           <a:lstStyle/>
           <a:p>
             <a:r>
-              <a:rPr lang="en-US" sz="2000" dirty="0" smtClean="0"/>
+              <a:rPr lang="en-US" sz="2400" dirty="0" smtClean="0"/>
               <a:t>Density of air</a:t>
             </a:r>
-            <a:endParaRPr lang="en-US" sz="2000" dirty="0"/>
+            <a:endParaRPr lang="en-US" sz="2400" dirty="0"/>
           </a:p>
         </p:txBody>
       </p:sp>
@@ -3627,8 +3627,8 @@
         </p:nvSpPr>
         <p:spPr>
           <a:xfrm>
-            <a:off x="7068142" y="661504"/>
-            <a:ext cx="1990156" cy="707886"/>
+            <a:off x="6729379" y="365245"/>
+            <a:ext cx="2210494" cy="830997"/>
           </a:xfrm>
           <a:prstGeom prst="rect">
             <a:avLst/>
@@ -3643,10 +3643,10 @@
           <a:p>
             <a:pPr algn="ctr"/>
             <a:r>
-              <a:rPr lang="en-US" sz="2000" dirty="0" smtClean="0"/>
+              <a:rPr lang="en-US" sz="2400" dirty="0" smtClean="0"/>
               <a:t>Drag coefficient of sphere</a:t>
             </a:r>
-            <a:endParaRPr lang="en-US" sz="2000" dirty="0"/>
+            <a:endParaRPr lang="en-US" sz="2400" dirty="0"/>
           </a:p>
         </p:txBody>
       </p:sp>
@@ -3658,8 +3658,8 @@
         </p:nvSpPr>
         <p:spPr>
           <a:xfrm>
-            <a:off x="7385115" y="2110298"/>
-            <a:ext cx="1618204" cy="707886"/>
+            <a:off x="7101651" y="1845122"/>
+            <a:ext cx="1838222" cy="830997"/>
           </a:xfrm>
           <a:prstGeom prst="rect">
             <a:avLst/>
@@ -3674,10 +3674,10 @@
           <a:p>
             <a:pPr algn="ctr"/>
             <a:r>
-              <a:rPr lang="en-US" sz="2000" dirty="0" smtClean="0"/>
+              <a:rPr lang="en-US" sz="2400" dirty="0" smtClean="0"/>
               <a:t>Total system velocity</a:t>
             </a:r>
-            <a:endParaRPr lang="en-US" sz="2000" dirty="0"/>
+            <a:endParaRPr lang="en-US" sz="2400" dirty="0"/>
           </a:p>
         </p:txBody>
       </p:sp>
@@ -3691,8 +3691,8 @@
         </p:nvCxnSpPr>
         <p:spPr>
           <a:xfrm flipH="1">
-            <a:off x="1925053" y="1169335"/>
-            <a:ext cx="186621" cy="360279"/>
+            <a:off x="1641591" y="934937"/>
+            <a:ext cx="186618" cy="329501"/>
           </a:xfrm>
           <a:prstGeom prst="line">
             <a:avLst/>
@@ -3728,7 +3728,7 @@
         </p:nvCxnSpPr>
         <p:spPr>
           <a:xfrm>
-            <a:off x="2270146" y="1986665"/>
+            <a:off x="1986682" y="1721489"/>
             <a:ext cx="164599" cy="194441"/>
           </a:xfrm>
           <a:prstGeom prst="line">
@@ -3765,7 +3765,7 @@
         </p:nvCxnSpPr>
         <p:spPr>
           <a:xfrm flipH="1" flipV="1">
-            <a:off x="6310262" y="1215463"/>
+            <a:off x="6026798" y="950287"/>
             <a:ext cx="132874" cy="314153"/>
           </a:xfrm>
           <a:prstGeom prst="line">
@@ -3802,7 +3802,7 @@
         </p:nvCxnSpPr>
         <p:spPr>
           <a:xfrm flipH="1">
-            <a:off x="6376699" y="1951261"/>
+            <a:off x="6093235" y="1686085"/>
             <a:ext cx="261456" cy="229845"/>
           </a:xfrm>
           <a:prstGeom prst="line">
@@ -3839,7 +3839,7 @@
         </p:nvCxnSpPr>
         <p:spPr>
           <a:xfrm flipV="1">
-            <a:off x="7154333" y="1098566"/>
+            <a:off x="6870869" y="833390"/>
             <a:ext cx="230782" cy="455358"/>
           </a:xfrm>
           <a:prstGeom prst="line">
@@ -3876,7 +3876,7 @@
         </p:nvCxnSpPr>
         <p:spPr>
           <a:xfrm>
-            <a:off x="7469310" y="1915753"/>
+            <a:off x="7185846" y="1650577"/>
             <a:ext cx="114056" cy="217403"/>
           </a:xfrm>
           <a:prstGeom prst="line">
@@ -3905,634 +3905,619 @@
           </a:fontRef>
         </p:style>
       </p:cxnSp>
-      <p:grpSp>
-        <p:nvGrpSpPr>
-          <p:cNvPr id="6" name="Group 5"/>
-          <p:cNvGrpSpPr/>
+      <p:sp>
+        <p:nvSpPr>
+          <p:cNvPr id="4" name="TextBox 3"/>
+          <p:cNvSpPr txBox="1"/>
           <p:nvPr/>
-        </p:nvGrpSpPr>
-        <p:grpSpPr>
-          <a:xfrm>
-            <a:off x="754937" y="3140794"/>
-            <a:ext cx="8303361" cy="2160771"/>
-            <a:chOff x="734314" y="3504860"/>
-            <a:chExt cx="8303361" cy="2160771"/>
-          </a:xfrm>
-        </p:grpSpPr>
-        <p:sp>
-          <p:nvSpPr>
-            <p:cNvPr id="4" name="TextBox 3"/>
-            <p:cNvSpPr txBox="1"/>
-            <p:nvPr/>
-          </p:nvSpPr>
-          <p:spPr>
-            <a:xfrm>
-              <a:off x="970012" y="4212746"/>
-              <a:ext cx="2700867" cy="584775"/>
-            </a:xfrm>
-            <a:prstGeom prst="rect">
-              <a:avLst/>
-            </a:prstGeom>
-            <a:noFill/>
-          </p:spPr>
-          <p:txBody>
-            <a:bodyPr wrap="square" rtlCol="0">
-              <a:spAutoFit/>
-            </a:bodyPr>
-            <a:lstStyle/>
-            <a:p>
-              <a:r>
-                <a:rPr lang="en-US" sz="3200" dirty="0" smtClean="0"/>
-                <a:t>F</a:t>
-              </a:r>
-              <a:r>
-                <a:rPr lang="en-US" sz="3200" baseline="-25000" dirty="0" smtClean="0"/>
-                <a:t>t</a:t>
-              </a:r>
-              <a:r>
-                <a:rPr lang="en-US" sz="3200" dirty="0" smtClean="0"/>
-                <a:t> = </a:t>
-              </a:r>
-              <a:r>
-                <a:rPr lang="en-US" sz="3200" dirty="0" err="1" smtClean="0"/>
-                <a:t>m</a:t>
-              </a:r>
-              <a:r>
-                <a:rPr lang="en-US" sz="3200" baseline="-25000" dirty="0" err="1" smtClean="0"/>
-                <a:t>b</a:t>
-              </a:r>
-              <a:r>
-                <a:rPr lang="en-US" sz="2000" dirty="0" smtClean="0"/>
-                <a:t> </a:t>
-              </a:r>
-              <a:r>
-                <a:rPr lang="en-US" sz="3200" dirty="0" smtClean="0"/>
-                <a:t>R</a:t>
-              </a:r>
-              <a:r>
-                <a:rPr lang="en-US" sz="2000" dirty="0" smtClean="0"/>
-                <a:t> </a:t>
-              </a:r>
-              <a:r>
-                <a:rPr lang="en-US" sz="3200" dirty="0" err="1"/>
-                <a:t>v</a:t>
-              </a:r>
-              <a:r>
-                <a:rPr lang="en-US" sz="3200" baseline="-25000" dirty="0" err="1" smtClean="0"/>
-                <a:t>m</a:t>
-              </a:r>
-              <a:endParaRPr lang="en-US" sz="3200" dirty="0"/>
-            </a:p>
-          </p:txBody>
-        </p:sp>
-        <p:sp>
-          <p:nvSpPr>
-            <p:cNvPr id="5" name="TextBox 4"/>
-            <p:cNvSpPr txBox="1"/>
-            <p:nvPr/>
-          </p:nvSpPr>
-          <p:spPr>
-            <a:xfrm>
-              <a:off x="4807194" y="4213933"/>
-              <a:ext cx="3454400" cy="584775"/>
-            </a:xfrm>
-            <a:prstGeom prst="rect">
-              <a:avLst/>
-            </a:prstGeom>
-            <a:noFill/>
-          </p:spPr>
-          <p:txBody>
-            <a:bodyPr wrap="square" rtlCol="0">
-              <a:spAutoFit/>
-            </a:bodyPr>
-            <a:lstStyle/>
-            <a:p>
-              <a:r>
-                <a:rPr lang="el-GR" sz="3200" dirty="0" smtClean="0"/>
-                <a:t>Δ</a:t>
-              </a:r>
-              <a:r>
-                <a:rPr lang="en-US" sz="3200" dirty="0" smtClean="0"/>
-                <a:t>M = R</a:t>
-              </a:r>
-              <a:r>
-                <a:rPr lang="en-US" sz="2000" dirty="0" smtClean="0"/>
-                <a:t> </a:t>
-              </a:r>
-              <a:r>
-                <a:rPr lang="en-US" sz="3200" dirty="0" smtClean="0"/>
-                <a:t>(</a:t>
-              </a:r>
-              <a:r>
-                <a:rPr lang="en-US" sz="3200" dirty="0" err="1" smtClean="0"/>
-                <a:t>m</a:t>
-              </a:r>
-              <a:r>
-                <a:rPr lang="en-US" sz="3200" baseline="-25000" dirty="0" err="1" smtClean="0"/>
-                <a:t>b</a:t>
-              </a:r>
-              <a:r>
-                <a:rPr lang="en-US" sz="2000" baseline="-25000" dirty="0" smtClean="0"/>
-                <a:t> </a:t>
-              </a:r>
-              <a:r>
-                <a:rPr lang="en-US" sz="3200" dirty="0" smtClean="0"/>
-                <a:t>+</a:t>
-              </a:r>
-              <a:r>
-                <a:rPr lang="en-US" sz="2000" dirty="0" smtClean="0"/>
-                <a:t> </a:t>
-              </a:r>
-              <a:r>
-                <a:rPr lang="en-US" sz="3200" dirty="0" smtClean="0"/>
-                <a:t>m</a:t>
-              </a:r>
-              <a:r>
-                <a:rPr lang="en-US" sz="3200" baseline="-25000" dirty="0" smtClean="0"/>
-                <a:t>c</a:t>
-              </a:r>
-              <a:r>
-                <a:rPr lang="en-US" sz="3200" dirty="0"/>
-                <a:t>)</a:t>
-              </a:r>
-            </a:p>
-          </p:txBody>
-        </p:sp>
-        <p:sp>
-          <p:nvSpPr>
-            <p:cNvPr id="13" name="TextBox 12"/>
-            <p:cNvSpPr txBox="1"/>
-            <p:nvPr/>
-          </p:nvSpPr>
-          <p:spPr>
-            <a:xfrm>
-              <a:off x="734314" y="4957745"/>
-              <a:ext cx="1272675" cy="707886"/>
-            </a:xfrm>
-            <a:prstGeom prst="rect">
-              <a:avLst/>
-            </a:prstGeom>
-            <a:noFill/>
-          </p:spPr>
-          <p:txBody>
-            <a:bodyPr wrap="square" rtlCol="0">
-              <a:spAutoFit/>
-            </a:bodyPr>
-            <a:lstStyle/>
-            <a:p>
-              <a:pPr algn="ctr"/>
-              <a:r>
-                <a:rPr lang="en-US" sz="2000" dirty="0" smtClean="0"/>
-                <a:t>Mass of one bullet</a:t>
-              </a:r>
-              <a:endParaRPr lang="en-US" sz="2000" dirty="0"/>
-            </a:p>
-          </p:txBody>
-        </p:sp>
-        <p:sp>
-          <p:nvSpPr>
-            <p:cNvPr id="14" name="TextBox 13"/>
-            <p:cNvSpPr txBox="1"/>
-            <p:nvPr/>
-          </p:nvSpPr>
-          <p:spPr>
-            <a:xfrm>
-              <a:off x="1856260" y="3778441"/>
-              <a:ext cx="2021305" cy="400110"/>
-            </a:xfrm>
-            <a:prstGeom prst="rect">
-              <a:avLst/>
-            </a:prstGeom>
-            <a:noFill/>
-          </p:spPr>
-          <p:txBody>
-            <a:bodyPr wrap="square" rtlCol="0">
-              <a:spAutoFit/>
-            </a:bodyPr>
-            <a:lstStyle/>
-            <a:p>
-              <a:r>
-                <a:rPr lang="en-US" sz="2000" dirty="0" smtClean="0"/>
-                <a:t>Rate of fire</a:t>
-              </a:r>
-              <a:endParaRPr lang="en-US" sz="2000" dirty="0"/>
-            </a:p>
-          </p:txBody>
-        </p:sp>
-        <p:sp>
-          <p:nvSpPr>
-            <p:cNvPr id="15" name="TextBox 14"/>
-            <p:cNvSpPr txBox="1"/>
-            <p:nvPr/>
-          </p:nvSpPr>
-          <p:spPr>
-            <a:xfrm>
-              <a:off x="2646860" y="4957745"/>
-              <a:ext cx="1809549" cy="707886"/>
-            </a:xfrm>
-            <a:prstGeom prst="rect">
-              <a:avLst/>
-            </a:prstGeom>
-            <a:noFill/>
-          </p:spPr>
-          <p:txBody>
-            <a:bodyPr wrap="square" rtlCol="0">
-              <a:spAutoFit/>
-            </a:bodyPr>
-            <a:lstStyle/>
-            <a:p>
-              <a:pPr algn="ctr"/>
-              <a:r>
-                <a:rPr lang="en-US" sz="2000" dirty="0" smtClean="0"/>
-                <a:t>Muzzle velocity of bullet</a:t>
-              </a:r>
-              <a:endParaRPr lang="en-US" sz="2000" dirty="0"/>
-            </a:p>
-          </p:txBody>
-        </p:sp>
-        <p:sp>
-          <p:nvSpPr>
-            <p:cNvPr id="16" name="TextBox 15"/>
-            <p:cNvSpPr txBox="1"/>
-            <p:nvPr/>
-          </p:nvSpPr>
-          <p:spPr>
-            <a:xfrm>
-              <a:off x="4877332" y="4957745"/>
-              <a:ext cx="2051341" cy="400110"/>
-            </a:xfrm>
-            <a:prstGeom prst="rect">
-              <a:avLst/>
-            </a:prstGeom>
-            <a:noFill/>
-          </p:spPr>
-          <p:txBody>
-            <a:bodyPr wrap="square" rtlCol="0">
-              <a:spAutoFit/>
-            </a:bodyPr>
-            <a:lstStyle/>
-            <a:p>
-              <a:r>
-                <a:rPr lang="en-US" sz="2000" dirty="0" smtClean="0"/>
-                <a:t>Rate of fire</a:t>
-              </a:r>
-              <a:endParaRPr lang="en-US" sz="2000" dirty="0"/>
-            </a:p>
-          </p:txBody>
-        </p:sp>
-        <p:sp>
-          <p:nvSpPr>
-            <p:cNvPr id="17" name="TextBox 16"/>
-            <p:cNvSpPr txBox="1"/>
-            <p:nvPr/>
-          </p:nvSpPr>
-          <p:spPr>
-            <a:xfrm>
-              <a:off x="6589608" y="3513378"/>
-              <a:ext cx="1727200" cy="707886"/>
-            </a:xfrm>
-            <a:prstGeom prst="rect">
-              <a:avLst/>
-            </a:prstGeom>
-            <a:noFill/>
-          </p:spPr>
-          <p:txBody>
-            <a:bodyPr wrap="square" rtlCol="0">
-              <a:spAutoFit/>
-            </a:bodyPr>
-            <a:lstStyle/>
-            <a:p>
-              <a:pPr algn="ctr"/>
-              <a:r>
-                <a:rPr lang="en-US" sz="2000" dirty="0" smtClean="0"/>
-                <a:t>Mass of one bullet</a:t>
-              </a:r>
-              <a:endParaRPr lang="en-US" sz="2000" dirty="0"/>
-            </a:p>
-          </p:txBody>
-        </p:sp>
-        <p:sp>
-          <p:nvSpPr>
-            <p:cNvPr id="18" name="TextBox 17"/>
-            <p:cNvSpPr txBox="1"/>
-            <p:nvPr/>
-          </p:nvSpPr>
-          <p:spPr>
-            <a:xfrm>
-              <a:off x="6939368" y="4957745"/>
-              <a:ext cx="2098307" cy="707886"/>
-            </a:xfrm>
-            <a:prstGeom prst="rect">
-              <a:avLst/>
-            </a:prstGeom>
-            <a:noFill/>
-          </p:spPr>
-          <p:txBody>
-            <a:bodyPr wrap="square" rtlCol="0">
-              <a:spAutoFit/>
-            </a:bodyPr>
-            <a:lstStyle/>
-            <a:p>
-              <a:pPr algn="ctr"/>
-              <a:r>
-                <a:rPr lang="en-US" sz="2000" dirty="0" smtClean="0"/>
-                <a:t>Mass of bullet casing</a:t>
-              </a:r>
-              <a:endParaRPr lang="en-US" sz="2000" dirty="0"/>
-            </a:p>
-          </p:txBody>
-        </p:sp>
-        <p:sp>
-          <p:nvSpPr>
-            <p:cNvPr id="19" name="TextBox 18"/>
-            <p:cNvSpPr txBox="1"/>
-            <p:nvPr/>
-          </p:nvSpPr>
-          <p:spPr>
-            <a:xfrm>
-              <a:off x="3721055" y="3504860"/>
-              <a:ext cx="2377440" cy="707886"/>
-            </a:xfrm>
-            <a:prstGeom prst="rect">
-              <a:avLst/>
-            </a:prstGeom>
-            <a:noFill/>
-          </p:spPr>
-          <p:txBody>
-            <a:bodyPr wrap="square" rtlCol="0">
-              <a:spAutoFit/>
-            </a:bodyPr>
-            <a:lstStyle/>
-            <a:p>
-              <a:pPr algn="ctr"/>
-              <a:r>
-                <a:rPr lang="en-US" sz="2000" dirty="0" smtClean="0"/>
-                <a:t>Change in total system mass</a:t>
-              </a:r>
-              <a:endParaRPr lang="en-US" sz="2000" dirty="0"/>
-            </a:p>
-          </p:txBody>
-        </p:sp>
-        <p:cxnSp>
-          <p:nvCxnSpPr>
-            <p:cNvPr id="56" name="Straight Connector 55"/>
-            <p:cNvCxnSpPr/>
-            <p:nvPr/>
-          </p:nvCxnSpPr>
-          <p:spPr>
-            <a:xfrm flipH="1" flipV="1">
-              <a:off x="2111674" y="4114800"/>
-              <a:ext cx="208771" cy="212929"/>
-            </a:xfrm>
-            <a:prstGeom prst="line">
-              <a:avLst/>
-            </a:prstGeom>
-            <a:ln w="19050">
-              <a:solidFill>
-                <a:schemeClr val="tx1"/>
-              </a:solidFill>
-              <a:headEnd type="triangle"/>
-              <a:tailEnd type="none" w="sm" len="med"/>
-            </a:ln>
-          </p:spPr>
-          <p:style>
-            <a:lnRef idx="1">
-              <a:schemeClr val="accent1"/>
-            </a:lnRef>
-            <a:fillRef idx="0">
-              <a:schemeClr val="accent1"/>
-            </a:fillRef>
-            <a:effectRef idx="0">
-              <a:schemeClr val="accent1"/>
-            </a:effectRef>
-            <a:fontRef idx="minor">
+        </p:nvSpPr>
+        <p:spPr>
+          <a:xfrm>
+            <a:off x="707171" y="3583504"/>
+            <a:ext cx="2700867" cy="584775"/>
+          </a:xfrm>
+          <a:prstGeom prst="rect">
+            <a:avLst/>
+          </a:prstGeom>
+          <a:noFill/>
+        </p:spPr>
+        <p:txBody>
+          <a:bodyPr wrap="square" rtlCol="0">
+            <a:spAutoFit/>
+          </a:bodyPr>
+          <a:lstStyle/>
+          <a:p>
+            <a:r>
+              <a:rPr lang="en-US" sz="3200" dirty="0" smtClean="0"/>
+              <a:t>F</a:t>
+            </a:r>
+            <a:r>
+              <a:rPr lang="en-US" sz="3200" baseline="-25000" dirty="0" smtClean="0"/>
+              <a:t>t</a:t>
+            </a:r>
+            <a:r>
+              <a:rPr lang="en-US" sz="3200" dirty="0" smtClean="0"/>
+              <a:t> = </a:t>
+            </a:r>
+            <a:r>
+              <a:rPr lang="en-US" sz="3200" dirty="0" err="1" smtClean="0"/>
+              <a:t>m</a:t>
+            </a:r>
+            <a:r>
+              <a:rPr lang="en-US" sz="3200" baseline="-25000" dirty="0" err="1" smtClean="0"/>
+              <a:t>b</a:t>
+            </a:r>
+            <a:r>
+              <a:rPr lang="en-US" sz="2000" dirty="0" smtClean="0"/>
+              <a:t> </a:t>
+            </a:r>
+            <a:r>
+              <a:rPr lang="en-US" sz="3200" dirty="0" smtClean="0"/>
+              <a:t>R</a:t>
+            </a:r>
+            <a:r>
+              <a:rPr lang="en-US" sz="2000" dirty="0" smtClean="0"/>
+              <a:t> </a:t>
+            </a:r>
+            <a:r>
+              <a:rPr lang="en-US" sz="3200" dirty="0" err="1"/>
+              <a:t>v</a:t>
+            </a:r>
+            <a:r>
+              <a:rPr lang="en-US" sz="3200" baseline="-25000" dirty="0" err="1" smtClean="0"/>
+              <a:t>m</a:t>
+            </a:r>
+            <a:endParaRPr lang="en-US" sz="3200" dirty="0"/>
+          </a:p>
+        </p:txBody>
+      </p:sp>
+      <p:sp>
+        <p:nvSpPr>
+          <p:cNvPr id="5" name="TextBox 4"/>
+          <p:cNvSpPr txBox="1"/>
+          <p:nvPr/>
+        </p:nvSpPr>
+        <p:spPr>
+          <a:xfrm>
+            <a:off x="4544353" y="3584691"/>
+            <a:ext cx="3454400" cy="584775"/>
+          </a:xfrm>
+          <a:prstGeom prst="rect">
+            <a:avLst/>
+          </a:prstGeom>
+          <a:noFill/>
+        </p:spPr>
+        <p:txBody>
+          <a:bodyPr wrap="square" rtlCol="0">
+            <a:spAutoFit/>
+          </a:bodyPr>
+          <a:lstStyle/>
+          <a:p>
+            <a:r>
+              <a:rPr lang="el-GR" sz="3200" dirty="0" smtClean="0"/>
+              <a:t>Δ</a:t>
+            </a:r>
+            <a:r>
+              <a:rPr lang="en-US" sz="3200" dirty="0" smtClean="0"/>
+              <a:t>M = R</a:t>
+            </a:r>
+            <a:r>
+              <a:rPr lang="en-US" sz="2000" dirty="0" smtClean="0"/>
+              <a:t> </a:t>
+            </a:r>
+            <a:r>
+              <a:rPr lang="en-US" sz="3200" dirty="0" smtClean="0"/>
+              <a:t>(</a:t>
+            </a:r>
+            <a:r>
+              <a:rPr lang="en-US" sz="3200" dirty="0" err="1" smtClean="0"/>
+              <a:t>m</a:t>
+            </a:r>
+            <a:r>
+              <a:rPr lang="en-US" sz="3200" baseline="-25000" dirty="0" err="1" smtClean="0"/>
+              <a:t>b</a:t>
+            </a:r>
+            <a:r>
+              <a:rPr lang="en-US" sz="2000" baseline="-25000" dirty="0" smtClean="0"/>
+              <a:t> </a:t>
+            </a:r>
+            <a:r>
+              <a:rPr lang="en-US" sz="3200" dirty="0" smtClean="0"/>
+              <a:t>+</a:t>
+            </a:r>
+            <a:r>
+              <a:rPr lang="en-US" sz="2000" dirty="0" smtClean="0"/>
+              <a:t> </a:t>
+            </a:r>
+            <a:r>
+              <a:rPr lang="en-US" sz="3200" dirty="0" smtClean="0"/>
+              <a:t>m</a:t>
+            </a:r>
+            <a:r>
+              <a:rPr lang="en-US" sz="3200" baseline="-25000" dirty="0" smtClean="0"/>
+              <a:t>c</a:t>
+            </a:r>
+            <a:r>
+              <a:rPr lang="en-US" sz="3200" dirty="0"/>
+              <a:t>)</a:t>
+            </a:r>
+          </a:p>
+        </p:txBody>
+      </p:sp>
+      <p:sp>
+        <p:nvSpPr>
+          <p:cNvPr id="13" name="TextBox 12"/>
+          <p:cNvSpPr txBox="1"/>
+          <p:nvPr/>
+        </p:nvSpPr>
+        <p:spPr>
+          <a:xfrm>
+            <a:off x="471473" y="4328503"/>
+            <a:ext cx="1491623" cy="830997"/>
+          </a:xfrm>
+          <a:prstGeom prst="rect">
+            <a:avLst/>
+          </a:prstGeom>
+          <a:noFill/>
+        </p:spPr>
+        <p:txBody>
+          <a:bodyPr wrap="square" rtlCol="0">
+            <a:spAutoFit/>
+          </a:bodyPr>
+          <a:lstStyle/>
+          <a:p>
+            <a:pPr algn="ctr"/>
+            <a:r>
+              <a:rPr lang="en-US" sz="2400" dirty="0" smtClean="0"/>
+              <a:t>Mass of one bullet</a:t>
+            </a:r>
+            <a:endParaRPr lang="en-US" sz="2400" dirty="0"/>
+          </a:p>
+        </p:txBody>
+      </p:sp>
+      <p:sp>
+        <p:nvSpPr>
+          <p:cNvPr id="14" name="TextBox 13"/>
+          <p:cNvSpPr txBox="1"/>
+          <p:nvPr/>
+        </p:nvSpPr>
+        <p:spPr>
+          <a:xfrm>
+            <a:off x="1538555" y="3094335"/>
+            <a:ext cx="2021305" cy="461665"/>
+          </a:xfrm>
+          <a:prstGeom prst="rect">
+            <a:avLst/>
+          </a:prstGeom>
+          <a:noFill/>
+        </p:spPr>
+        <p:txBody>
+          <a:bodyPr wrap="square" rtlCol="0">
+            <a:spAutoFit/>
+          </a:bodyPr>
+          <a:lstStyle/>
+          <a:p>
+            <a:r>
+              <a:rPr lang="en-US" sz="2400" dirty="0" smtClean="0"/>
+              <a:t>Rate of fire</a:t>
+            </a:r>
+            <a:endParaRPr lang="en-US" sz="2400" dirty="0"/>
+          </a:p>
+        </p:txBody>
+      </p:sp>
+      <p:sp>
+        <p:nvSpPr>
+          <p:cNvPr id="15" name="TextBox 14"/>
+          <p:cNvSpPr txBox="1"/>
+          <p:nvPr/>
+        </p:nvSpPr>
+        <p:spPr>
+          <a:xfrm>
+            <a:off x="2151281" y="4424665"/>
+            <a:ext cx="2166924" cy="830997"/>
+          </a:xfrm>
+          <a:prstGeom prst="rect">
+            <a:avLst/>
+          </a:prstGeom>
+          <a:noFill/>
+        </p:spPr>
+        <p:txBody>
+          <a:bodyPr wrap="square" rtlCol="0">
+            <a:spAutoFit/>
+          </a:bodyPr>
+          <a:lstStyle/>
+          <a:p>
+            <a:pPr algn="ctr"/>
+            <a:r>
+              <a:rPr lang="en-US" sz="2400" dirty="0" smtClean="0"/>
+              <a:t>Muzzle velocity of bullet</a:t>
+            </a:r>
+            <a:endParaRPr lang="en-US" sz="2400" dirty="0"/>
+          </a:p>
+        </p:txBody>
+      </p:sp>
+      <p:sp>
+        <p:nvSpPr>
+          <p:cNvPr id="16" name="TextBox 15"/>
+          <p:cNvSpPr txBox="1"/>
+          <p:nvPr/>
+        </p:nvSpPr>
+        <p:spPr>
+          <a:xfrm>
+            <a:off x="4614491" y="4328503"/>
+            <a:ext cx="2051341" cy="461665"/>
+          </a:xfrm>
+          <a:prstGeom prst="rect">
+            <a:avLst/>
+          </a:prstGeom>
+          <a:noFill/>
+        </p:spPr>
+        <p:txBody>
+          <a:bodyPr wrap="square" rtlCol="0">
+            <a:spAutoFit/>
+          </a:bodyPr>
+          <a:lstStyle/>
+          <a:p>
+            <a:r>
+              <a:rPr lang="en-US" sz="2400" dirty="0" smtClean="0"/>
+              <a:t>Rate of fire</a:t>
+            </a:r>
+            <a:endParaRPr lang="en-US" sz="2400" dirty="0"/>
+          </a:p>
+        </p:txBody>
+      </p:sp>
+      <p:sp>
+        <p:nvSpPr>
+          <p:cNvPr id="17" name="TextBox 16"/>
+          <p:cNvSpPr txBox="1"/>
+          <p:nvPr/>
+        </p:nvSpPr>
+        <p:spPr>
+          <a:xfrm>
+            <a:off x="6326767" y="2884136"/>
+            <a:ext cx="1727200" cy="830997"/>
+          </a:xfrm>
+          <a:prstGeom prst="rect">
+            <a:avLst/>
+          </a:prstGeom>
+          <a:noFill/>
+        </p:spPr>
+        <p:txBody>
+          <a:bodyPr wrap="square" rtlCol="0">
+            <a:spAutoFit/>
+          </a:bodyPr>
+          <a:lstStyle/>
+          <a:p>
+            <a:pPr algn="ctr"/>
+            <a:r>
+              <a:rPr lang="en-US" sz="2400" dirty="0" smtClean="0"/>
+              <a:t>Mass of one bullet</a:t>
+            </a:r>
+            <a:endParaRPr lang="en-US" sz="2400" dirty="0"/>
+          </a:p>
+        </p:txBody>
+      </p:sp>
+      <p:sp>
+        <p:nvSpPr>
+          <p:cNvPr id="18" name="TextBox 17"/>
+          <p:cNvSpPr txBox="1"/>
+          <p:nvPr/>
+        </p:nvSpPr>
+        <p:spPr>
+          <a:xfrm>
+            <a:off x="6676527" y="4328503"/>
+            <a:ext cx="2098307" cy="830997"/>
+          </a:xfrm>
+          <a:prstGeom prst="rect">
+            <a:avLst/>
+          </a:prstGeom>
+          <a:noFill/>
+        </p:spPr>
+        <p:txBody>
+          <a:bodyPr wrap="square" rtlCol="0">
+            <a:spAutoFit/>
+          </a:bodyPr>
+          <a:lstStyle/>
+          <a:p>
+            <a:pPr algn="ctr"/>
+            <a:r>
+              <a:rPr lang="en-US" sz="2400" dirty="0" smtClean="0"/>
+              <a:t>Mass of bullet casing</a:t>
+            </a:r>
+            <a:endParaRPr lang="en-US" sz="2400" dirty="0"/>
+          </a:p>
+        </p:txBody>
+      </p:sp>
+      <p:sp>
+        <p:nvSpPr>
+          <p:cNvPr id="19" name="TextBox 18"/>
+          <p:cNvSpPr txBox="1"/>
+          <p:nvPr/>
+        </p:nvSpPr>
+        <p:spPr>
+          <a:xfrm>
+            <a:off x="3425771" y="2772724"/>
+            <a:ext cx="2377440" cy="830997"/>
+          </a:xfrm>
+          <a:prstGeom prst="rect">
+            <a:avLst/>
+          </a:prstGeom>
+          <a:noFill/>
+        </p:spPr>
+        <p:txBody>
+          <a:bodyPr wrap="square" rtlCol="0">
+            <a:spAutoFit/>
+          </a:bodyPr>
+          <a:lstStyle/>
+          <a:p>
+            <a:pPr algn="ctr"/>
+            <a:r>
+              <a:rPr lang="en-US" sz="2400" dirty="0" smtClean="0"/>
+              <a:t>Change in total system mass</a:t>
+            </a:r>
+            <a:endParaRPr lang="en-US" sz="2400" dirty="0"/>
+          </a:p>
+        </p:txBody>
+      </p:sp>
+      <p:cxnSp>
+        <p:nvCxnSpPr>
+          <p:cNvPr id="56" name="Straight Connector 55"/>
+          <p:cNvCxnSpPr/>
+          <p:nvPr/>
+        </p:nvCxnSpPr>
+        <p:spPr>
+          <a:xfrm flipH="1" flipV="1">
+            <a:off x="1848833" y="3485558"/>
+            <a:ext cx="208771" cy="212929"/>
+          </a:xfrm>
+          <a:prstGeom prst="line">
+            <a:avLst/>
+          </a:prstGeom>
+          <a:ln w="19050">
+            <a:solidFill>
               <a:schemeClr val="tx1"/>
-            </a:fontRef>
-          </p:style>
-        </p:cxnSp>
-        <p:cxnSp>
-          <p:nvCxnSpPr>
-            <p:cNvPr id="62" name="Straight Connector 61"/>
-            <p:cNvCxnSpPr/>
-            <p:nvPr/>
-          </p:nvCxnSpPr>
-          <p:spPr>
-            <a:xfrm flipH="1">
-              <a:off x="1346200" y="4740143"/>
-              <a:ext cx="406400" cy="289057"/>
-            </a:xfrm>
-            <a:prstGeom prst="line">
-              <a:avLst/>
-            </a:prstGeom>
-            <a:ln w="19050">
-              <a:solidFill>
-                <a:schemeClr val="tx1"/>
-              </a:solidFill>
-              <a:headEnd type="triangle"/>
-              <a:tailEnd type="none" w="sm" len="med"/>
-            </a:ln>
-          </p:spPr>
-          <p:style>
-            <a:lnRef idx="1">
-              <a:schemeClr val="accent1"/>
-            </a:lnRef>
-            <a:fillRef idx="0">
-              <a:schemeClr val="accent1"/>
-            </a:fillRef>
-            <a:effectRef idx="0">
-              <a:schemeClr val="accent1"/>
-            </a:effectRef>
-            <a:fontRef idx="minor">
+            </a:solidFill>
+            <a:headEnd type="triangle"/>
+            <a:tailEnd type="none" w="sm" len="med"/>
+          </a:ln>
+        </p:spPr>
+        <p:style>
+          <a:lnRef idx="1">
+            <a:schemeClr val="accent1"/>
+          </a:lnRef>
+          <a:fillRef idx="0">
+            <a:schemeClr val="accent1"/>
+          </a:fillRef>
+          <a:effectRef idx="0">
+            <a:schemeClr val="accent1"/>
+          </a:effectRef>
+          <a:fontRef idx="minor">
+            <a:schemeClr val="tx1"/>
+          </a:fontRef>
+        </p:style>
+      </p:cxnSp>
+      <p:cxnSp>
+        <p:nvCxnSpPr>
+          <p:cNvPr id="62" name="Straight Connector 61"/>
+          <p:cNvCxnSpPr/>
+          <p:nvPr/>
+        </p:nvCxnSpPr>
+        <p:spPr>
+          <a:xfrm flipH="1">
+            <a:off x="1083359" y="4110901"/>
+            <a:ext cx="406400" cy="289057"/>
+          </a:xfrm>
+          <a:prstGeom prst="line">
+            <a:avLst/>
+          </a:prstGeom>
+          <a:ln w="19050">
+            <a:solidFill>
               <a:schemeClr val="tx1"/>
-            </a:fontRef>
-          </p:style>
-        </p:cxnSp>
-        <p:cxnSp>
-          <p:nvCxnSpPr>
-            <p:cNvPr id="66" name="Straight Connector 65"/>
-            <p:cNvCxnSpPr/>
-            <p:nvPr/>
-          </p:nvCxnSpPr>
-          <p:spPr>
-            <a:xfrm>
-              <a:off x="2618875" y="4740143"/>
-              <a:ext cx="54456" cy="417657"/>
-            </a:xfrm>
-            <a:prstGeom prst="line">
-              <a:avLst/>
-            </a:prstGeom>
-            <a:ln w="19050">
-              <a:solidFill>
-                <a:schemeClr val="tx1"/>
-              </a:solidFill>
-              <a:headEnd type="triangle"/>
-              <a:tailEnd type="none" w="sm" len="med"/>
-            </a:ln>
-          </p:spPr>
-          <p:style>
-            <a:lnRef idx="1">
-              <a:schemeClr val="accent1"/>
-            </a:lnRef>
-            <a:fillRef idx="0">
-              <a:schemeClr val="accent1"/>
-            </a:fillRef>
-            <a:effectRef idx="0">
-              <a:schemeClr val="accent1"/>
-            </a:effectRef>
-            <a:fontRef idx="minor">
+            </a:solidFill>
+            <a:headEnd type="triangle"/>
+            <a:tailEnd type="none" w="sm" len="med"/>
+          </a:ln>
+        </p:spPr>
+        <p:style>
+          <a:lnRef idx="1">
+            <a:schemeClr val="accent1"/>
+          </a:lnRef>
+          <a:fillRef idx="0">
+            <a:schemeClr val="accent1"/>
+          </a:fillRef>
+          <a:effectRef idx="0">
+            <a:schemeClr val="accent1"/>
+          </a:effectRef>
+          <a:fontRef idx="minor">
+            <a:schemeClr val="tx1"/>
+          </a:fontRef>
+        </p:style>
+      </p:cxnSp>
+      <p:cxnSp>
+        <p:nvCxnSpPr>
+          <p:cNvPr id="66" name="Straight Connector 65"/>
+          <p:cNvCxnSpPr/>
+          <p:nvPr/>
+        </p:nvCxnSpPr>
+        <p:spPr>
+          <a:xfrm>
+            <a:off x="2356034" y="4110901"/>
+            <a:ext cx="54456" cy="417657"/>
+          </a:xfrm>
+          <a:prstGeom prst="line">
+            <a:avLst/>
+          </a:prstGeom>
+          <a:ln w="19050">
+            <a:solidFill>
               <a:schemeClr val="tx1"/>
-            </a:fontRef>
-          </p:style>
-        </p:cxnSp>
-        <p:cxnSp>
-          <p:nvCxnSpPr>
-            <p:cNvPr id="70" name="Straight Connector 69"/>
-            <p:cNvCxnSpPr/>
-            <p:nvPr/>
-          </p:nvCxnSpPr>
-          <p:spPr>
-            <a:xfrm flipH="1" flipV="1">
-              <a:off x="4593346" y="4169262"/>
-              <a:ext cx="316429" cy="246376"/>
-            </a:xfrm>
-            <a:prstGeom prst="line">
-              <a:avLst/>
-            </a:prstGeom>
-            <a:ln w="19050">
-              <a:solidFill>
-                <a:schemeClr val="tx1"/>
-              </a:solidFill>
-              <a:headEnd type="triangle"/>
-              <a:tailEnd type="none" w="sm" len="med"/>
-            </a:ln>
-          </p:spPr>
-          <p:style>
-            <a:lnRef idx="1">
-              <a:schemeClr val="accent1"/>
-            </a:lnRef>
-            <a:fillRef idx="0">
-              <a:schemeClr val="accent1"/>
-            </a:fillRef>
-            <a:effectRef idx="0">
-              <a:schemeClr val="accent1"/>
-            </a:effectRef>
-            <a:fontRef idx="minor">
+            </a:solidFill>
+            <a:headEnd type="triangle"/>
+            <a:tailEnd type="none" w="sm" len="med"/>
+          </a:ln>
+        </p:spPr>
+        <p:style>
+          <a:lnRef idx="1">
+            <a:schemeClr val="accent1"/>
+          </a:lnRef>
+          <a:fillRef idx="0">
+            <a:schemeClr val="accent1"/>
+          </a:fillRef>
+          <a:effectRef idx="0">
+            <a:schemeClr val="accent1"/>
+          </a:effectRef>
+          <a:fontRef idx="minor">
+            <a:schemeClr val="tx1"/>
+          </a:fontRef>
+        </p:style>
+      </p:cxnSp>
+      <p:cxnSp>
+        <p:nvCxnSpPr>
+          <p:cNvPr id="70" name="Straight Connector 69"/>
+          <p:cNvCxnSpPr/>
+          <p:nvPr/>
+        </p:nvCxnSpPr>
+        <p:spPr>
+          <a:xfrm flipH="1" flipV="1">
+            <a:off x="4330505" y="3540020"/>
+            <a:ext cx="316429" cy="246376"/>
+          </a:xfrm>
+          <a:prstGeom prst="line">
+            <a:avLst/>
+          </a:prstGeom>
+          <a:ln w="19050">
+            <a:solidFill>
               <a:schemeClr val="tx1"/>
-            </a:fontRef>
-          </p:style>
-        </p:cxnSp>
-        <p:cxnSp>
-          <p:nvCxnSpPr>
-            <p:cNvPr id="73" name="Straight Connector 72"/>
-            <p:cNvCxnSpPr/>
-            <p:nvPr/>
-          </p:nvCxnSpPr>
-          <p:spPr>
-            <a:xfrm flipH="1">
-              <a:off x="5503736" y="4679870"/>
-              <a:ext cx="399266" cy="334070"/>
-            </a:xfrm>
-            <a:prstGeom prst="line">
-              <a:avLst/>
-            </a:prstGeom>
-            <a:ln w="19050">
-              <a:solidFill>
-                <a:schemeClr val="tx1"/>
-              </a:solidFill>
-              <a:headEnd type="triangle"/>
-              <a:tailEnd type="none" w="sm" len="med"/>
-            </a:ln>
-          </p:spPr>
-          <p:style>
-            <a:lnRef idx="1">
-              <a:schemeClr val="accent1"/>
-            </a:lnRef>
-            <a:fillRef idx="0">
-              <a:schemeClr val="accent1"/>
-            </a:fillRef>
-            <a:effectRef idx="0">
-              <a:schemeClr val="accent1"/>
-            </a:effectRef>
-            <a:fontRef idx="minor">
+            </a:solidFill>
+            <a:headEnd type="triangle"/>
+            <a:tailEnd type="none" w="sm" len="med"/>
+          </a:ln>
+        </p:spPr>
+        <p:style>
+          <a:lnRef idx="1">
+            <a:schemeClr val="accent1"/>
+          </a:lnRef>
+          <a:fillRef idx="0">
+            <a:schemeClr val="accent1"/>
+          </a:fillRef>
+          <a:effectRef idx="0">
+            <a:schemeClr val="accent1"/>
+          </a:effectRef>
+          <a:fontRef idx="minor">
+            <a:schemeClr val="tx1"/>
+          </a:fontRef>
+        </p:style>
+      </p:cxnSp>
+      <p:cxnSp>
+        <p:nvCxnSpPr>
+          <p:cNvPr id="73" name="Straight Connector 72"/>
+          <p:cNvCxnSpPr/>
+          <p:nvPr/>
+        </p:nvCxnSpPr>
+        <p:spPr>
+          <a:xfrm flipH="1">
+            <a:off x="5240895" y="4050628"/>
+            <a:ext cx="399266" cy="334070"/>
+          </a:xfrm>
+          <a:prstGeom prst="line">
+            <a:avLst/>
+          </a:prstGeom>
+          <a:ln w="19050">
+            <a:solidFill>
               <a:schemeClr val="tx1"/>
-            </a:fontRef>
-          </p:style>
-        </p:cxnSp>
-        <p:cxnSp>
-          <p:nvCxnSpPr>
-            <p:cNvPr id="77" name="Straight Connector 76"/>
-            <p:cNvCxnSpPr/>
-            <p:nvPr/>
-          </p:nvCxnSpPr>
-          <p:spPr>
-            <a:xfrm flipV="1">
-              <a:off x="6443136" y="3867321"/>
-              <a:ext cx="496232" cy="473375"/>
-            </a:xfrm>
-            <a:prstGeom prst="line">
-              <a:avLst/>
-            </a:prstGeom>
-            <a:ln w="19050">
-              <a:solidFill>
-                <a:schemeClr val="tx1"/>
-              </a:solidFill>
-              <a:headEnd type="triangle"/>
-              <a:tailEnd type="none" w="sm" len="med"/>
-            </a:ln>
-          </p:spPr>
-          <p:style>
-            <a:lnRef idx="1">
-              <a:schemeClr val="accent1"/>
-            </a:lnRef>
-            <a:fillRef idx="0">
-              <a:schemeClr val="accent1"/>
-            </a:fillRef>
-            <a:effectRef idx="0">
-              <a:schemeClr val="accent1"/>
-            </a:effectRef>
-            <a:fontRef idx="minor">
+            </a:solidFill>
+            <a:headEnd type="triangle"/>
+            <a:tailEnd type="none" w="sm" len="med"/>
+          </a:ln>
+        </p:spPr>
+        <p:style>
+          <a:lnRef idx="1">
+            <a:schemeClr val="accent1"/>
+          </a:lnRef>
+          <a:fillRef idx="0">
+            <a:schemeClr val="accent1"/>
+          </a:fillRef>
+          <a:effectRef idx="0">
+            <a:schemeClr val="accent1"/>
+          </a:effectRef>
+          <a:fontRef idx="minor">
+            <a:schemeClr val="tx1"/>
+          </a:fontRef>
+        </p:style>
+      </p:cxnSp>
+      <p:cxnSp>
+        <p:nvCxnSpPr>
+          <p:cNvPr id="77" name="Straight Connector 76"/>
+          <p:cNvCxnSpPr/>
+          <p:nvPr/>
+        </p:nvCxnSpPr>
+        <p:spPr>
+          <a:xfrm flipV="1">
+            <a:off x="6180295" y="3325167"/>
+            <a:ext cx="496232" cy="386288"/>
+          </a:xfrm>
+          <a:prstGeom prst="line">
+            <a:avLst/>
+          </a:prstGeom>
+          <a:ln w="19050">
+            <a:solidFill>
               <a:schemeClr val="tx1"/>
-            </a:fontRef>
-          </p:style>
-        </p:cxnSp>
-        <p:cxnSp>
-          <p:nvCxnSpPr>
-            <p:cNvPr id="81" name="Straight Connector 80"/>
-            <p:cNvCxnSpPr/>
-            <p:nvPr/>
-          </p:nvCxnSpPr>
-          <p:spPr>
-            <a:xfrm>
-              <a:off x="7142726" y="4677947"/>
-              <a:ext cx="80008" cy="335993"/>
-            </a:xfrm>
-            <a:prstGeom prst="line">
-              <a:avLst/>
-            </a:prstGeom>
-            <a:ln w="19050">
-              <a:solidFill>
-                <a:schemeClr val="tx1"/>
-              </a:solidFill>
-              <a:headEnd type="triangle"/>
-              <a:tailEnd type="none" w="sm" len="med"/>
-            </a:ln>
-          </p:spPr>
-          <p:style>
-            <a:lnRef idx="1">
-              <a:schemeClr val="accent1"/>
-            </a:lnRef>
-            <a:fillRef idx="0">
-              <a:schemeClr val="accent1"/>
-            </a:fillRef>
-            <a:effectRef idx="0">
-              <a:schemeClr val="accent1"/>
-            </a:effectRef>
-            <a:fontRef idx="minor">
+            </a:solidFill>
+            <a:headEnd type="triangle"/>
+            <a:tailEnd type="none" w="sm" len="med"/>
+          </a:ln>
+        </p:spPr>
+        <p:style>
+          <a:lnRef idx="1">
+            <a:schemeClr val="accent1"/>
+          </a:lnRef>
+          <a:fillRef idx="0">
+            <a:schemeClr val="accent1"/>
+          </a:fillRef>
+          <a:effectRef idx="0">
+            <a:schemeClr val="accent1"/>
+          </a:effectRef>
+          <a:fontRef idx="minor">
+            <a:schemeClr val="tx1"/>
+          </a:fontRef>
+        </p:style>
+      </p:cxnSp>
+      <p:cxnSp>
+        <p:nvCxnSpPr>
+          <p:cNvPr id="81" name="Straight Connector 80"/>
+          <p:cNvCxnSpPr/>
+          <p:nvPr/>
+        </p:nvCxnSpPr>
+        <p:spPr>
+          <a:xfrm>
+            <a:off x="6879885" y="4048705"/>
+            <a:ext cx="80008" cy="335993"/>
+          </a:xfrm>
+          <a:prstGeom prst="line">
+            <a:avLst/>
+          </a:prstGeom>
+          <a:ln w="19050">
+            <a:solidFill>
               <a:schemeClr val="tx1"/>
-            </a:fontRef>
-          </p:style>
-        </p:cxnSp>
-      </p:grpSp>
+            </a:solidFill>
+            <a:headEnd type="triangle"/>
+            <a:tailEnd type="none" w="sm" len="med"/>
+          </a:ln>
+        </p:spPr>
+        <p:style>
+          <a:lnRef idx="1">
+            <a:schemeClr val="accent1"/>
+          </a:lnRef>
+          <a:fillRef idx="0">
+            <a:schemeClr val="accent1"/>
+          </a:fillRef>
+          <a:effectRef idx="0">
+            <a:schemeClr val="accent1"/>
+          </a:effectRef>
+          <a:fontRef idx="minor">
+            <a:schemeClr val="tx1"/>
+          </a:fontRef>
+        </p:style>
+      </p:cxnSp>
     </p:spTree>
     <p:extLst>
       <p:ext uri="{BB962C8B-B14F-4D97-AF65-F5344CB8AC3E}">

</xml_diff>